<commit_message>
Doing final project ppt
</commit_message>
<xml_diff>
--- a/Final Project/Report.pptx
+++ b/Final Project/Report.pptx
@@ -5,23 +5,26 @@
     <p:sldMasterId id="2147483750" r:id="rId4"/>
   </p:sldMasterIdLst>
   <p:notesMasterIdLst>
-    <p:notesMasterId r:id="rId16"/>
+    <p:notesMasterId r:id="rId19"/>
   </p:notesMasterIdLst>
   <p:handoutMasterIdLst>
-    <p:handoutMasterId r:id="rId17"/>
+    <p:handoutMasterId r:id="rId20"/>
   </p:handoutMasterIdLst>
   <p:sldIdLst>
     <p:sldId id="257" r:id="rId5"/>
-    <p:sldId id="268" r:id="rId6"/>
-    <p:sldId id="267" r:id="rId7"/>
-    <p:sldId id="269" r:id="rId8"/>
-    <p:sldId id="270" r:id="rId9"/>
-    <p:sldId id="259" r:id="rId10"/>
-    <p:sldId id="261" r:id="rId11"/>
-    <p:sldId id="262" r:id="rId12"/>
-    <p:sldId id="263" r:id="rId13"/>
-    <p:sldId id="271" r:id="rId14"/>
-    <p:sldId id="265" r:id="rId15"/>
+    <p:sldId id="273" r:id="rId6"/>
+    <p:sldId id="268" r:id="rId7"/>
+    <p:sldId id="272" r:id="rId8"/>
+    <p:sldId id="274" r:id="rId9"/>
+    <p:sldId id="267" r:id="rId10"/>
+    <p:sldId id="269" r:id="rId11"/>
+    <p:sldId id="270" r:id="rId12"/>
+    <p:sldId id="259" r:id="rId13"/>
+    <p:sldId id="261" r:id="rId14"/>
+    <p:sldId id="262" r:id="rId15"/>
+    <p:sldId id="263" r:id="rId16"/>
+    <p:sldId id="271" r:id="rId17"/>
+    <p:sldId id="265" r:id="rId18"/>
   </p:sldIdLst>
   <p:sldSz cx="12188825" cy="6858000"/>
   <p:notesSz cx="6858000" cy="9144000"/>
@@ -5235,7 +5238,7 @@
                 <a:ea typeface="+mj-ea"/>
               </a:rPr>
               <a:pPr algn="r" rtl="0"/>
-              <a:t>2018/12/24</a:t>
+              <a:t>2018/12/25</a:t>
             </a:fld>
             <a:endParaRPr lang="zh-TW" altLang="en-US" dirty="0">
               <a:latin typeface="+mj-ea"/>
@@ -5517,7 +5520,7 @@
                 <a:ea typeface="+mj-ea"/>
               </a:rPr>
               <a:pPr algn="r" rtl="0"/>
-              <a:t>2018/12/24</a:t>
+              <a:t>2018/12/25</a:t>
             </a:fld>
             <a:endParaRPr lang="zh-TW" altLang="en-US" dirty="0">
               <a:latin typeface="+mj-ea"/>
@@ -5885,7 +5888,7 @@
                 <a:ea typeface="+mj-ea"/>
               </a:rPr>
               <a:pPr algn="r" rtl="0"/>
-              <a:t>10</a:t>
+              <a:t>13</a:t>
             </a:fld>
             <a:endParaRPr lang="zh-TW" altLang="en-US" dirty="0">
               <a:latin typeface="+mj-ea"/>
@@ -5985,7 +5988,7 @@
                 <a:ea typeface="+mj-ea"/>
               </a:rPr>
               <a:pPr algn="r" rtl="0"/>
-              <a:t>11</a:t>
+              <a:t>14</a:t>
             </a:fld>
             <a:endParaRPr lang="zh-TW" altLang="en-US" dirty="0">
               <a:latin typeface="+mj-ea"/>
@@ -6085,7 +6088,7 @@
                 <a:ea typeface="+mj-ea"/>
               </a:rPr>
               <a:pPr algn="r" rtl="0"/>
-              <a:t>2</a:t>
+              <a:t>3</a:t>
             </a:fld>
             <a:endParaRPr lang="zh-TW" altLang="en-US" dirty="0">
               <a:latin typeface="+mj-ea"/>
@@ -6185,7 +6188,7 @@
                 <a:ea typeface="+mj-ea"/>
               </a:rPr>
               <a:pPr algn="r" rtl="0"/>
-              <a:t>3</a:t>
+              <a:t>6</a:t>
             </a:fld>
             <a:endParaRPr lang="zh-TW" altLang="en-US" dirty="0">
               <a:latin typeface="+mj-ea"/>
@@ -6285,7 +6288,7 @@
                 <a:ea typeface="+mj-ea"/>
               </a:rPr>
               <a:pPr algn="r" rtl="0"/>
-              <a:t>4</a:t>
+              <a:t>7</a:t>
             </a:fld>
             <a:endParaRPr lang="zh-TW" altLang="en-US" dirty="0">
               <a:latin typeface="+mj-ea"/>
@@ -6389,7 +6392,7 @@
                 <a:ea typeface="+mj-ea"/>
               </a:rPr>
               <a:pPr algn="r" rtl="0"/>
-              <a:t>5</a:t>
+              <a:t>8</a:t>
             </a:fld>
             <a:endParaRPr lang="zh-TW" altLang="en-US" dirty="0">
               <a:latin typeface="+mj-ea"/>
@@ -6492,7 +6495,7 @@
                 <a:ea typeface="+mj-ea"/>
               </a:rPr>
               <a:pPr algn="r" rtl="0"/>
-              <a:t>6</a:t>
+              <a:t>9</a:t>
             </a:fld>
             <a:endParaRPr lang="zh-TW" altLang="en-US" dirty="0">
               <a:latin typeface="+mj-ea"/>
@@ -6592,7 +6595,7 @@
                 <a:ea typeface="+mj-ea"/>
               </a:rPr>
               <a:pPr algn="r" rtl="0"/>
-              <a:t>7</a:t>
+              <a:t>10</a:t>
             </a:fld>
             <a:endParaRPr lang="zh-TW" altLang="en-US" dirty="0">
               <a:latin typeface="+mj-ea"/>
@@ -6692,7 +6695,7 @@
                 <a:ea typeface="+mj-ea"/>
               </a:rPr>
               <a:pPr algn="r" rtl="0"/>
-              <a:t>8</a:t>
+              <a:t>11</a:t>
             </a:fld>
             <a:endParaRPr lang="zh-TW" altLang="en-US" dirty="0">
               <a:latin typeface="+mj-ea"/>
@@ -6792,7 +6795,7 @@
                 <a:ea typeface="+mj-ea"/>
               </a:rPr>
               <a:pPr algn="r" rtl="0"/>
-              <a:t>9</a:t>
+              <a:t>12</a:t>
             </a:fld>
             <a:endParaRPr lang="zh-TW" altLang="en-US" dirty="0">
               <a:latin typeface="+mj-ea"/>
@@ -7000,7 +7003,7 @@
             <a:fld id="{9648EAF3-A6E8-4E9A-8D84-778422506FC2}" type="datetime1">
               <a:rPr lang="zh-TW" altLang="en-US" smtClean="0"/>
               <a:pPr/>
-              <a:t>2018/12/24</a:t>
+              <a:t>2018/12/25</a:t>
             </a:fld>
             <a:endParaRPr lang="zh-TW" altLang="en-US" dirty="0"/>
           </a:p>
@@ -7319,7 +7322,7 @@
             <a:fld id="{9648EAF3-A6E8-4E9A-8D84-778422506FC2}" type="datetime1">
               <a:rPr lang="zh-TW" altLang="en-US" smtClean="0"/>
               <a:pPr/>
-              <a:t>2018/12/24</a:t>
+              <a:t>2018/12/25</a:t>
             </a:fld>
             <a:endParaRPr lang="zh-TW" altLang="en-US" dirty="0"/>
           </a:p>
@@ -7520,7 +7523,7 @@
             <a:fld id="{9648EAF3-A6E8-4E9A-8D84-778422506FC2}" type="datetime1">
               <a:rPr lang="zh-TW" altLang="en-US" smtClean="0"/>
               <a:pPr/>
-              <a:t>2018/12/24</a:t>
+              <a:t>2018/12/25</a:t>
             </a:fld>
             <a:endParaRPr lang="zh-TW" altLang="en-US" dirty="0"/>
           </a:p>
@@ -7790,7 +7793,7 @@
             <a:fld id="{9648EAF3-A6E8-4E9A-8D84-778422506FC2}" type="datetime1">
               <a:rPr lang="zh-TW" altLang="en-US" smtClean="0"/>
               <a:pPr/>
-              <a:t>2018/12/24</a:t>
+              <a:t>2018/12/25</a:t>
             </a:fld>
             <a:endParaRPr lang="zh-TW" altLang="en-US" dirty="0"/>
           </a:p>
@@ -8223,7 +8226,7 @@
             <a:fld id="{9648EAF3-A6E8-4E9A-8D84-778422506FC2}" type="datetime1">
               <a:rPr lang="zh-TW" altLang="en-US" smtClean="0"/>
               <a:pPr/>
-              <a:t>2018/12/24</a:t>
+              <a:t>2018/12/25</a:t>
             </a:fld>
             <a:endParaRPr lang="zh-TW" altLang="en-US" dirty="0"/>
           </a:p>
@@ -8769,7 +8772,7 @@
             <a:fld id="{9648EAF3-A6E8-4E9A-8D84-778422506FC2}" type="datetime1">
               <a:rPr lang="zh-TW" altLang="en-US" smtClean="0"/>
               <a:pPr/>
-              <a:t>2018/12/24</a:t>
+              <a:t>2018/12/25</a:t>
             </a:fld>
             <a:endParaRPr lang="zh-TW" altLang="en-US" dirty="0"/>
           </a:p>
@@ -9635,7 +9638,7 @@
             <a:fld id="{9648EAF3-A6E8-4E9A-8D84-778422506FC2}" type="datetime1">
               <a:rPr lang="zh-TW" altLang="en-US" smtClean="0"/>
               <a:pPr/>
-              <a:t>2018/12/24</a:t>
+              <a:t>2018/12/25</a:t>
             </a:fld>
             <a:endParaRPr lang="zh-TW" altLang="en-US" dirty="0"/>
           </a:p>
@@ -9807,7 +9810,7 @@
             <a:fld id="{9648EAF3-A6E8-4E9A-8D84-778422506FC2}" type="datetime1">
               <a:rPr lang="zh-TW" altLang="en-US" smtClean="0"/>
               <a:pPr/>
-              <a:t>2018/12/24</a:t>
+              <a:t>2018/12/25</a:t>
             </a:fld>
             <a:endParaRPr lang="zh-TW" altLang="en-US" dirty="0"/>
           </a:p>
@@ -10013,7 +10016,7 @@
             <a:fld id="{9648EAF3-A6E8-4E9A-8D84-778422506FC2}" type="datetime1">
               <a:rPr lang="zh-TW" altLang="en-US" smtClean="0"/>
               <a:pPr/>
-              <a:t>2018/12/24</a:t>
+              <a:t>2018/12/25</a:t>
             </a:fld>
             <a:endParaRPr lang="zh-TW" altLang="en-US" dirty="0"/>
           </a:p>
@@ -10205,7 +10208,7 @@
             <a:fld id="{9648EAF3-A6E8-4E9A-8D84-778422506FC2}" type="datetime1">
               <a:rPr lang="zh-TW" altLang="en-US" smtClean="0"/>
               <a:pPr/>
-              <a:t>2018/12/24</a:t>
+              <a:t>2018/12/25</a:t>
             </a:fld>
             <a:endParaRPr lang="zh-TW" altLang="en-US" dirty="0"/>
           </a:p>
@@ -10458,7 +10461,7 @@
             <a:fld id="{9648EAF3-A6E8-4E9A-8D84-778422506FC2}" type="datetime1">
               <a:rPr lang="zh-TW" altLang="en-US" smtClean="0"/>
               <a:pPr/>
-              <a:t>2018/12/24</a:t>
+              <a:t>2018/12/25</a:t>
             </a:fld>
             <a:endParaRPr lang="zh-TW" altLang="en-US" dirty="0"/>
           </a:p>
@@ -10716,7 +10719,7 @@
             <a:fld id="{9648EAF3-A6E8-4E9A-8D84-778422506FC2}" type="datetime1">
               <a:rPr lang="zh-TW" altLang="en-US" smtClean="0"/>
               <a:pPr/>
-              <a:t>2018/12/24</a:t>
+              <a:t>2018/12/25</a:t>
             </a:fld>
             <a:endParaRPr lang="zh-TW" altLang="en-US" dirty="0"/>
           </a:p>
@@ -11191,7 +11194,7 @@
             <a:fld id="{9648EAF3-A6E8-4E9A-8D84-778422506FC2}" type="datetime1">
               <a:rPr lang="zh-TW" altLang="en-US" smtClean="0"/>
               <a:pPr/>
-              <a:t>2018/12/24</a:t>
+              <a:t>2018/12/25</a:t>
             </a:fld>
             <a:endParaRPr lang="zh-TW" altLang="en-US" dirty="0"/>
           </a:p>
@@ -11318,7 +11321,7 @@
             <a:fld id="{9648EAF3-A6E8-4E9A-8D84-778422506FC2}" type="datetime1">
               <a:rPr lang="zh-TW" altLang="en-US" smtClean="0"/>
               <a:pPr/>
-              <a:t>2018/12/24</a:t>
+              <a:t>2018/12/25</a:t>
             </a:fld>
             <a:endParaRPr lang="zh-TW" altLang="en-US" dirty="0"/>
           </a:p>
@@ -11435,7 +11438,7 @@
             <a:fld id="{9648EAF3-A6E8-4E9A-8D84-778422506FC2}" type="datetime1">
               <a:rPr lang="zh-TW" altLang="en-US" smtClean="0"/>
               <a:pPr/>
-              <a:t>2018/12/24</a:t>
+              <a:t>2018/12/25</a:t>
             </a:fld>
             <a:endParaRPr lang="zh-TW" altLang="en-US" dirty="0"/>
           </a:p>
@@ -11712,7 +11715,7 @@
             <a:fld id="{9648EAF3-A6E8-4E9A-8D84-778422506FC2}" type="datetime1">
               <a:rPr lang="zh-TW" altLang="en-US" smtClean="0"/>
               <a:pPr/>
-              <a:t>2018/12/24</a:t>
+              <a:t>2018/12/25</a:t>
             </a:fld>
             <a:endParaRPr lang="zh-TW" altLang="en-US" dirty="0"/>
           </a:p>
@@ -12034,7 +12037,7 @@
             <a:fld id="{9648EAF3-A6E8-4E9A-8D84-778422506FC2}" type="datetime1">
               <a:rPr lang="zh-TW" altLang="en-US" smtClean="0"/>
               <a:pPr/>
-              <a:t>2018/12/24</a:t>
+              <a:t>2018/12/25</a:t>
             </a:fld>
             <a:endParaRPr lang="zh-TW" altLang="en-US" dirty="0"/>
           </a:p>
@@ -12290,7 +12293,7 @@
             <a:fld id="{9648EAF3-A6E8-4E9A-8D84-778422506FC2}" type="datetime1">
               <a:rPr lang="zh-TW" altLang="en-US" smtClean="0"/>
               <a:pPr/>
-              <a:t>2018/12/24</a:t>
+              <a:t>2018/12/25</a:t>
             </a:fld>
             <a:endParaRPr lang="zh-TW" altLang="en-US" dirty="0"/>
           </a:p>
@@ -13012,8 +13015,8 @@
         </p:nvSpPr>
         <p:spPr>
           <a:xfrm>
-            <a:off x="-1588" y="304800"/>
-            <a:ext cx="12188825" cy="2362200"/>
+            <a:off x="-9826" y="0"/>
+            <a:ext cx="12188825" cy="3048000"/>
           </a:xfrm>
         </p:spPr>
         <p:txBody>
@@ -13024,12 +13027,28 @@
           <a:p>
             <a:pPr rtl="0"/>
             <a:r>
+              <a:rPr lang="en-US" altLang="zh-TW" sz="8000" dirty="0" smtClean="0">
+                <a:latin typeface="微軟正黑體" panose="020B0604030504040204" pitchFamily="34" charset="-120"/>
+                <a:ea typeface="微軟正黑體" panose="020B0604030504040204" pitchFamily="34" charset="-120"/>
+                <a:sym typeface="Salesforce Sans"/>
+              </a:rPr>
+              <a:t>Gaussian </a:t>
+            </a:r>
+            <a:r>
+              <a:rPr lang="en-US" altLang="zh-TW" sz="8000" dirty="0" smtClean="0">
+                <a:latin typeface="微軟正黑體" panose="020B0604030504040204" pitchFamily="34" charset="-120"/>
+                <a:ea typeface="微軟正黑體" panose="020B0604030504040204" pitchFamily="34" charset="-120"/>
+                <a:sym typeface="Salesforce Sans"/>
+              </a:rPr>
+              <a:t>Blur</a:t>
+            </a:r>
+            <a:r>
               <a:rPr lang="en-US" altLang="zh-TW" sz="6700" dirty="0" smtClean="0">
                 <a:latin typeface="微軟正黑體" panose="020B0604030504040204" pitchFamily="34" charset="-120"/>
                 <a:ea typeface="微軟正黑體" panose="020B0604030504040204" pitchFamily="34" charset="-120"/>
                 <a:sym typeface="Salesforce Sans"/>
               </a:rPr>
-              <a:t>Gaussian Blur</a:t>
+              <a:t/>
             </a:r>
             <a:br>
               <a:rPr lang="en-US" altLang="zh-TW" sz="6700" dirty="0" smtClean="0">
@@ -13039,6 +13058,21 @@
               </a:rPr>
             </a:br>
             <a:r>
+              <a:rPr lang="en-US" altLang="zh-TW" sz="6700" dirty="0" smtClean="0">
+                <a:latin typeface="微軟正黑體" panose="020B0604030504040204" pitchFamily="34" charset="-120"/>
+                <a:ea typeface="微軟正黑體" panose="020B0604030504040204" pitchFamily="34" charset="-120"/>
+                <a:sym typeface="Salesforce Sans"/>
+              </a:rPr>
+              <a:t/>
+            </a:r>
+            <a:br>
+              <a:rPr lang="en-US" altLang="zh-TW" sz="6700" dirty="0" smtClean="0">
+                <a:latin typeface="微軟正黑體" panose="020B0604030504040204" pitchFamily="34" charset="-120"/>
+                <a:ea typeface="微軟正黑體" panose="020B0604030504040204" pitchFamily="34" charset="-120"/>
+                <a:sym typeface="Salesforce Sans"/>
+              </a:rPr>
+            </a:br>
+            <a:r>
               <a:rPr lang="en-US" altLang="zh-TW" sz="5300" dirty="0" smtClean="0">
                 <a:latin typeface="微軟正黑體" panose="020B0604030504040204" pitchFamily="34" charset="-120"/>
                 <a:ea typeface="微軟正黑體" panose="020B0604030504040204" pitchFamily="34" charset="-120"/>
@@ -13066,13 +13100,13 @@
         </p:nvSpPr>
         <p:spPr>
           <a:xfrm>
-            <a:off x="1726749" y="4191000"/>
+            <a:off x="1716923" y="4267200"/>
             <a:ext cx="8735325" cy="2286000"/>
           </a:xfrm>
         </p:spPr>
         <p:txBody>
           <a:bodyPr rtlCol="0">
-            <a:normAutofit/>
+            <a:noAutofit/>
           </a:bodyPr>
           <a:lstStyle/>
           <a:p>
@@ -13160,7 +13194,7 @@
           </a:p>
           <a:p>
             <a:pPr rtl="0"/>
-            <a:endParaRPr lang="zh-TW" altLang="en-US" sz="2000" dirty="0">
+            <a:endParaRPr lang="zh-TW" altLang="en-US" sz="3000" dirty="0">
               <a:latin typeface="微軟正黑體" panose="020B0604030504040204" pitchFamily="34" charset="-120"/>
               <a:ea typeface="微軟正黑體" panose="020B0604030504040204" pitchFamily="34" charset="-120"/>
               <a:sym typeface="Salesforce Sans"/>
@@ -13219,6 +13253,288 @@
       </p:grpSpPr>
       <p:sp>
         <p:nvSpPr>
+          <p:cNvPr id="7" name="標題 6"/>
+          <p:cNvSpPr>
+            <a:spLocks noGrp="1"/>
+          </p:cNvSpPr>
+          <p:nvPr>
+            <p:ph type="title"/>
+          </p:nvPr>
+        </p:nvSpPr>
+        <p:spPr/>
+        <p:txBody>
+          <a:bodyPr rtlCol="0"/>
+          <a:lstStyle/>
+          <a:p>
+            <a:pPr rtl="0"/>
+            <a:r>
+              <a:rPr lang="zh-TW" altLang="en-US" dirty="0" smtClean="0">
+                <a:sym typeface="Salesforce Sans"/>
+              </a:rPr>
+              <a:t>新增投影片標題 </a:t>
+            </a:r>
+            <a:r>
+              <a:rPr lang="en-US" altLang="zh-TW" dirty="0" smtClean="0">
+                <a:sym typeface="Salesforce Sans"/>
+              </a:rPr>
+              <a:t>- 2</a:t>
+            </a:r>
+            <a:endParaRPr lang="zh-TW" altLang="en-US" dirty="0">
+              <a:sym typeface="Salesforce Sans"/>
+            </a:endParaRPr>
+          </a:p>
+        </p:txBody>
+      </p:sp>
+      <p:sp>
+        <p:nvSpPr>
+          <p:cNvPr id="8" name="文字預留位置 7"/>
+          <p:cNvSpPr>
+            <a:spLocks noGrp="1"/>
+          </p:cNvSpPr>
+          <p:nvPr>
+            <p:ph type="body" idx="1"/>
+          </p:nvPr>
+        </p:nvSpPr>
+        <p:spPr/>
+        <p:txBody>
+          <a:bodyPr rtlCol="0"/>
+          <a:lstStyle/>
+          <a:p>
+            <a:pPr rtl="0"/>
+            <a:endParaRPr lang="zh-TW" altLang="en-US" dirty="0">
+              <a:sym typeface="Salesforce Sans"/>
+            </a:endParaRPr>
+          </a:p>
+        </p:txBody>
+      </p:sp>
+      <p:sp>
+        <p:nvSpPr>
+          <p:cNvPr id="10" name="內容預留位置 9"/>
+          <p:cNvSpPr>
+            <a:spLocks noGrp="1"/>
+          </p:cNvSpPr>
+          <p:nvPr>
+            <p:ph sz="half" idx="2"/>
+          </p:nvPr>
+        </p:nvSpPr>
+        <p:spPr/>
+        <p:txBody>
+          <a:bodyPr rtlCol="0"/>
+          <a:lstStyle/>
+          <a:p>
+            <a:pPr rtl="0"/>
+            <a:endParaRPr lang="zh-TW" altLang="en-US" dirty="0">
+              <a:sym typeface="Salesforce Sans"/>
+            </a:endParaRPr>
+          </a:p>
+        </p:txBody>
+      </p:sp>
+      <p:sp>
+        <p:nvSpPr>
+          <p:cNvPr id="9" name="文字預留位置 8"/>
+          <p:cNvSpPr>
+            <a:spLocks noGrp="1"/>
+          </p:cNvSpPr>
+          <p:nvPr>
+            <p:ph type="body" sz="quarter" idx="3"/>
+          </p:nvPr>
+        </p:nvSpPr>
+        <p:spPr/>
+        <p:txBody>
+          <a:bodyPr rtlCol="0"/>
+          <a:lstStyle/>
+          <a:p>
+            <a:pPr rtl="0"/>
+            <a:endParaRPr lang="zh-TW" altLang="en-US" dirty="0">
+              <a:sym typeface="Salesforce Sans"/>
+            </a:endParaRPr>
+          </a:p>
+        </p:txBody>
+      </p:sp>
+      <p:sp>
+        <p:nvSpPr>
+          <p:cNvPr id="11" name="內容預留位置 10"/>
+          <p:cNvSpPr>
+            <a:spLocks noGrp="1"/>
+          </p:cNvSpPr>
+          <p:nvPr>
+            <p:ph sz="quarter" idx="4"/>
+          </p:nvPr>
+        </p:nvSpPr>
+        <p:spPr/>
+        <p:txBody>
+          <a:bodyPr rtlCol="0"/>
+          <a:lstStyle/>
+          <a:p>
+            <a:pPr rtl="0"/>
+            <a:endParaRPr lang="zh-TW" altLang="en-US" dirty="0">
+              <a:sym typeface="Salesforce Sans"/>
+            </a:endParaRPr>
+          </a:p>
+        </p:txBody>
+      </p:sp>
+    </p:spTree>
+    <p:extLst>
+      <p:ext uri="{BB962C8B-B14F-4D97-AF65-F5344CB8AC3E}">
+        <p14:creationId xmlns:p14="http://schemas.microsoft.com/office/powerpoint/2010/main" val="2672039197"/>
+      </p:ext>
+    </p:extLst>
+  </p:cSld>
+  <p:clrMapOvr>
+    <a:masterClrMapping/>
+  </p:clrMapOvr>
+  <mc:AlternateContent xmlns:mc="http://schemas.openxmlformats.org/markup-compatibility/2006" xmlns:p14="http://schemas.microsoft.com/office/powerpoint/2010/main">
+    <mc:Choice Requires="p14">
+      <p:transition spd="med" p14:dur="700">
+        <p:fade/>
+      </p:transition>
+    </mc:Choice>
+    <mc:Fallback xmlns="">
+      <p:transition spd="med">
+        <p:fade/>
+      </p:transition>
+    </mc:Fallback>
+  </mc:AlternateContent>
+</p:sld>
+</file>
+
+<file path=ppt/slides/slide11.xml><?xml version="1.0" encoding="utf-8"?>
+<p:sld xmlns:a="http://schemas.openxmlformats.org/drawingml/2006/main" xmlns:r="http://schemas.openxmlformats.org/officeDocument/2006/relationships" xmlns:p="http://schemas.openxmlformats.org/presentationml/2006/main">
+  <p:cSld>
+    <p:spTree>
+      <p:nvGrpSpPr>
+        <p:cNvPr id="1" name=""/>
+        <p:cNvGrpSpPr/>
+        <p:nvPr/>
+      </p:nvGrpSpPr>
+      <p:grpSpPr>
+        <a:xfrm>
+          <a:off x="0" y="0"/>
+          <a:ext cx="0" cy="0"/>
+          <a:chOff x="0" y="0"/>
+          <a:chExt cx="0" cy="0"/>
+        </a:xfrm>
+      </p:grpSpPr>
+      <p:sp>
+        <p:nvSpPr>
+          <p:cNvPr id="3" name="標題 2"/>
+          <p:cNvSpPr>
+            <a:spLocks noGrp="1"/>
+          </p:cNvSpPr>
+          <p:nvPr>
+            <p:ph type="title"/>
+          </p:nvPr>
+        </p:nvSpPr>
+        <p:spPr/>
+        <p:txBody>
+          <a:bodyPr rtlCol="0"/>
+          <a:lstStyle/>
+          <a:p>
+            <a:pPr rtl="0"/>
+            <a:r>
+              <a:rPr lang="zh-TW" altLang="en-US" dirty="0" smtClean="0">
+                <a:sym typeface="Salesforce Sans"/>
+              </a:rPr>
+              <a:t>新增投影片標題 </a:t>
+            </a:r>
+            <a:r>
+              <a:rPr lang="en-US" altLang="zh-TW" dirty="0" smtClean="0">
+                <a:sym typeface="Salesforce Sans"/>
+              </a:rPr>
+              <a:t>- 3</a:t>
+            </a:r>
+            <a:endParaRPr lang="zh-TW" altLang="en-US" dirty="0">
+              <a:sym typeface="Salesforce Sans"/>
+            </a:endParaRPr>
+          </a:p>
+        </p:txBody>
+      </p:sp>
+    </p:spTree>
+    <p:extLst>
+      <p:ext uri="{BB962C8B-B14F-4D97-AF65-F5344CB8AC3E}">
+        <p14:creationId xmlns:p14="http://schemas.microsoft.com/office/powerpoint/2010/main" val="397710800"/>
+      </p:ext>
+    </p:extLst>
+  </p:cSld>
+  <p:clrMapOvr>
+    <a:masterClrMapping/>
+  </p:clrMapOvr>
+  <mc:AlternateContent xmlns:mc="http://schemas.openxmlformats.org/markup-compatibility/2006" xmlns:p14="http://schemas.microsoft.com/office/powerpoint/2010/main">
+    <mc:Choice Requires="p14">
+      <p:transition spd="med" p14:dur="700">
+        <p:fade/>
+      </p:transition>
+    </mc:Choice>
+    <mc:Fallback xmlns="">
+      <p:transition spd="med">
+        <p:fade/>
+      </p:transition>
+    </mc:Fallback>
+  </mc:AlternateContent>
+</p:sld>
+</file>
+
+<file path=ppt/slides/slide12.xml><?xml version="1.0" encoding="utf-8"?>
+<p:sld xmlns:a="http://schemas.openxmlformats.org/drawingml/2006/main" xmlns:r="http://schemas.openxmlformats.org/officeDocument/2006/relationships" xmlns:p="http://schemas.openxmlformats.org/presentationml/2006/main">
+  <p:cSld>
+    <p:spTree>
+      <p:nvGrpSpPr>
+        <p:cNvPr id="1" name=""/>
+        <p:cNvGrpSpPr/>
+        <p:nvPr/>
+      </p:nvGrpSpPr>
+      <p:grpSpPr>
+        <a:xfrm>
+          <a:off x="0" y="0"/>
+          <a:ext cx="0" cy="0"/>
+          <a:chOff x="0" y="0"/>
+          <a:chExt cx="0" cy="0"/>
+        </a:xfrm>
+      </p:grpSpPr>
+    </p:spTree>
+    <p:extLst>
+      <p:ext uri="{BB962C8B-B14F-4D97-AF65-F5344CB8AC3E}">
+        <p14:creationId xmlns:p14="http://schemas.microsoft.com/office/powerpoint/2010/main" val="1405850135"/>
+      </p:ext>
+    </p:extLst>
+  </p:cSld>
+  <p:clrMapOvr>
+    <a:masterClrMapping/>
+  </p:clrMapOvr>
+  <mc:AlternateContent xmlns:mc="http://schemas.openxmlformats.org/markup-compatibility/2006" xmlns:p14="http://schemas.microsoft.com/office/powerpoint/2010/main">
+    <mc:Choice Requires="p14">
+      <p:transition spd="med" p14:dur="700">
+        <p:fade/>
+      </p:transition>
+    </mc:Choice>
+    <mc:Fallback xmlns="">
+      <p:transition spd="med">
+        <p:fade/>
+      </p:transition>
+    </mc:Fallback>
+  </mc:AlternateContent>
+</p:sld>
+</file>
+
+<file path=ppt/slides/slide13.xml><?xml version="1.0" encoding="utf-8"?>
+<p:sld xmlns:a="http://schemas.openxmlformats.org/drawingml/2006/main" xmlns:r="http://schemas.openxmlformats.org/officeDocument/2006/relationships" xmlns:p="http://schemas.openxmlformats.org/presentationml/2006/main">
+  <p:cSld>
+    <p:spTree>
+      <p:nvGrpSpPr>
+        <p:cNvPr id="1" name=""/>
+        <p:cNvGrpSpPr/>
+        <p:nvPr/>
+      </p:nvGrpSpPr>
+      <p:grpSpPr>
+        <a:xfrm>
+          <a:off x="0" y="0"/>
+          <a:ext cx="0" cy="0"/>
+          <a:chOff x="0" y="0"/>
+          <a:chExt cx="0" cy="0"/>
+        </a:xfrm>
+      </p:grpSpPr>
+      <p:sp>
+        <p:nvSpPr>
           <p:cNvPr id="2" name="標題 1"/>
           <p:cNvSpPr>
             <a:spLocks noGrp="1"/>
@@ -13320,7 +13636,7 @@
 </p:sld>
 </file>
 
-<file path=ppt/slides/slide11.xml><?xml version="1.0" encoding="utf-8"?>
+<file path=ppt/slides/slide14.xml><?xml version="1.0" encoding="utf-8"?>
 <p:sld xmlns:a="http://schemas.openxmlformats.org/drawingml/2006/main" xmlns:r="http://schemas.openxmlformats.org/officeDocument/2006/relationships" xmlns:p="http://schemas.openxmlformats.org/presentationml/2006/main">
   <p:cSld>
     <p:spTree>
@@ -13449,7 +13765,7 @@
       </p:grpSpPr>
       <p:sp>
         <p:nvSpPr>
-          <p:cNvPr id="13" name="標題 12"/>
+          <p:cNvPr id="2" name="標題 1"/>
           <p:cNvSpPr>
             <a:spLocks noGrp="1"/>
           </p:cNvSpPr>
@@ -13459,13 +13775,217 @@
         </p:nvSpPr>
         <p:spPr>
           <a:xfrm>
-            <a:off x="913557" y="0"/>
+            <a:off x="913557" y="32951"/>
             <a:ext cx="10351066" cy="970450"/>
           </a:xfrm>
         </p:spPr>
         <p:txBody>
+          <a:bodyPr>
+            <a:normAutofit/>
+          </a:bodyPr>
+          <a:lstStyle/>
+          <a:p>
+            <a:r>
+              <a:rPr lang="en-US" sz="4800" dirty="0" smtClean="0">
+                <a:latin typeface="微軟正黑體" panose="020B0604030504040204" pitchFamily="34" charset="-120"/>
+                <a:ea typeface="微軟正黑體" panose="020B0604030504040204" pitchFamily="34" charset="-120"/>
+              </a:rPr>
+              <a:t>Outline</a:t>
+            </a:r>
+            <a:endParaRPr lang="en-US" sz="4800" dirty="0">
+              <a:latin typeface="微軟正黑體" panose="020B0604030504040204" pitchFamily="34" charset="-120"/>
+              <a:ea typeface="微軟正黑體" panose="020B0604030504040204" pitchFamily="34" charset="-120"/>
+            </a:endParaRPr>
+          </a:p>
+        </p:txBody>
+      </p:sp>
+      <p:sp>
+        <p:nvSpPr>
+          <p:cNvPr id="3" name="內容版面配置區 2"/>
+          <p:cNvSpPr>
+            <a:spLocks noGrp="1"/>
+          </p:cNvSpPr>
+          <p:nvPr>
+            <p:ph idx="1"/>
+          </p:nvPr>
+        </p:nvSpPr>
+        <p:spPr>
+          <a:xfrm>
+            <a:off x="926385" y="1003401"/>
+            <a:ext cx="10351066" cy="5854599"/>
+          </a:xfrm>
+        </p:spPr>
+        <p:txBody>
+          <a:bodyPr>
+            <a:normAutofit/>
+          </a:bodyPr>
+          <a:lstStyle/>
+          <a:p>
+            <a:r>
+              <a:rPr lang="en-US" sz="2800" dirty="0" smtClean="0">
+                <a:latin typeface="微軟正黑體" panose="020B0604030504040204" pitchFamily="34" charset="-120"/>
+                <a:ea typeface="微軟正黑體" panose="020B0604030504040204" pitchFamily="34" charset="-120"/>
+              </a:rPr>
+              <a:t>Gaussian Blur explained.</a:t>
+            </a:r>
+          </a:p>
+          <a:p>
+            <a:r>
+              <a:rPr lang="en-US" sz="2800" dirty="0" smtClean="0">
+                <a:latin typeface="微軟正黑體" panose="020B0604030504040204" pitchFamily="34" charset="-120"/>
+                <a:ea typeface="微軟正黑體" panose="020B0604030504040204" pitchFamily="34" charset="-120"/>
+              </a:rPr>
+              <a:t>Motivation.</a:t>
+            </a:r>
+          </a:p>
+          <a:p>
+            <a:r>
+              <a:rPr lang="en-US" sz="2800" dirty="0" smtClean="0">
+                <a:latin typeface="微軟正黑體" panose="020B0604030504040204" pitchFamily="34" charset="-120"/>
+                <a:ea typeface="微軟正黑體" panose="020B0604030504040204" pitchFamily="34" charset="-120"/>
+              </a:rPr>
+              <a:t>Hardware for this project</a:t>
+            </a:r>
+          </a:p>
+          <a:p>
+            <a:r>
+              <a:rPr lang="en-US" sz="2800" dirty="0" smtClean="0">
+                <a:latin typeface="微軟正黑體" panose="020B0604030504040204" pitchFamily="34" charset="-120"/>
+                <a:ea typeface="微軟正黑體" panose="020B0604030504040204" pitchFamily="34" charset="-120"/>
+              </a:rPr>
+              <a:t>Parallelization platform animation.</a:t>
+            </a:r>
+          </a:p>
+          <a:p>
+            <a:r>
+              <a:rPr lang="en-US" sz="2800" dirty="0" smtClean="0">
+                <a:latin typeface="微軟正黑體" panose="020B0604030504040204" pitchFamily="34" charset="-120"/>
+                <a:ea typeface="微軟正黑體" panose="020B0604030504040204" pitchFamily="34" charset="-120"/>
+              </a:rPr>
+              <a:t>Different platforms explained and respective discoveries .</a:t>
+            </a:r>
+          </a:p>
+          <a:p>
+            <a:pPr lvl="1"/>
+            <a:r>
+              <a:rPr lang="en-US" sz="2400" dirty="0" smtClean="0">
+                <a:latin typeface="微軟正黑體" panose="020B0604030504040204" pitchFamily="34" charset="-120"/>
+                <a:ea typeface="微軟正黑體" panose="020B0604030504040204" pitchFamily="34" charset="-120"/>
+              </a:rPr>
+              <a:t>CUDA</a:t>
+            </a:r>
+          </a:p>
+          <a:p>
+            <a:pPr lvl="1"/>
+            <a:r>
+              <a:rPr lang="en-US" sz="2400" dirty="0" smtClean="0">
+                <a:latin typeface="微軟正黑體" panose="020B0604030504040204" pitchFamily="34" charset="-120"/>
+                <a:ea typeface="微軟正黑體" panose="020B0604030504040204" pitchFamily="34" charset="-120"/>
+              </a:rPr>
+              <a:t>OpenCL</a:t>
+            </a:r>
+          </a:p>
+          <a:p>
+            <a:pPr lvl="1"/>
+            <a:r>
+              <a:rPr lang="en-US" sz="2400" dirty="0" err="1" smtClean="0">
+                <a:latin typeface="微軟正黑體" panose="020B0604030504040204" pitchFamily="34" charset="-120"/>
+                <a:ea typeface="微軟正黑體" panose="020B0604030504040204" pitchFamily="34" charset="-120"/>
+              </a:rPr>
+              <a:t>OpenMP</a:t>
+            </a:r>
+            <a:endParaRPr lang="en-US" sz="2400" dirty="0" smtClean="0">
+              <a:latin typeface="微軟正黑體" panose="020B0604030504040204" pitchFamily="34" charset="-120"/>
+              <a:ea typeface="微軟正黑體" panose="020B0604030504040204" pitchFamily="34" charset="-120"/>
+            </a:endParaRPr>
+          </a:p>
+          <a:p>
+            <a:r>
+              <a:rPr lang="en-US" sz="2800" dirty="0" smtClean="0">
+                <a:latin typeface="微軟正黑體" panose="020B0604030504040204" pitchFamily="34" charset="-120"/>
+                <a:ea typeface="微軟正黑體" panose="020B0604030504040204" pitchFamily="34" charset="-120"/>
+              </a:rPr>
+              <a:t>Demo video.</a:t>
+            </a:r>
+          </a:p>
+          <a:p>
+            <a:r>
+              <a:rPr lang="en-US" sz="2800" dirty="0" smtClean="0">
+                <a:latin typeface="微軟正黑體" panose="020B0604030504040204" pitchFamily="34" charset="-120"/>
+                <a:ea typeface="微軟正黑體" panose="020B0604030504040204" pitchFamily="34" charset="-120"/>
+              </a:rPr>
+              <a:t>Q&amp;A </a:t>
+            </a:r>
+          </a:p>
+          <a:p>
+            <a:endParaRPr lang="en-US" sz="2400" dirty="0" smtClean="0">
+              <a:latin typeface="微軟正黑體" panose="020B0604030504040204" pitchFamily="34" charset="-120"/>
+              <a:ea typeface="微軟正黑體" panose="020B0604030504040204" pitchFamily="34" charset="-120"/>
+            </a:endParaRPr>
+          </a:p>
+          <a:p>
+            <a:endParaRPr lang="en-US" sz="2400" dirty="0" smtClean="0">
+              <a:latin typeface="微軟正黑體" panose="020B0604030504040204" pitchFamily="34" charset="-120"/>
+              <a:ea typeface="微軟正黑體" panose="020B0604030504040204" pitchFamily="34" charset="-120"/>
+            </a:endParaRPr>
+          </a:p>
+          <a:p>
+            <a:endParaRPr lang="en-US" sz="2400" dirty="0">
+              <a:latin typeface="微軟正黑體" panose="020B0604030504040204" pitchFamily="34" charset="-120"/>
+              <a:ea typeface="微軟正黑體" panose="020B0604030504040204" pitchFamily="34" charset="-120"/>
+            </a:endParaRPr>
+          </a:p>
+        </p:txBody>
+      </p:sp>
+    </p:spTree>
+    <p:extLst>
+      <p:ext uri="{BB962C8B-B14F-4D97-AF65-F5344CB8AC3E}">
+        <p14:creationId xmlns:p14="http://schemas.microsoft.com/office/powerpoint/2010/main" val="2695480174"/>
+      </p:ext>
+    </p:extLst>
+  </p:cSld>
+  <p:clrMapOvr>
+    <a:masterClrMapping/>
+  </p:clrMapOvr>
+</p:sld>
+</file>
+
+<file path=ppt/slides/slide3.xml><?xml version="1.0" encoding="utf-8"?>
+<p:sld xmlns:a="http://schemas.openxmlformats.org/drawingml/2006/main" xmlns:r="http://schemas.openxmlformats.org/officeDocument/2006/relationships" xmlns:p="http://schemas.openxmlformats.org/presentationml/2006/main">
+  <p:cSld>
+    <p:spTree>
+      <p:nvGrpSpPr>
+        <p:cNvPr id="1" name=""/>
+        <p:cNvGrpSpPr/>
+        <p:nvPr/>
+      </p:nvGrpSpPr>
+      <p:grpSpPr>
+        <a:xfrm>
+          <a:off x="0" y="0"/>
+          <a:ext cx="0" cy="0"/>
+          <a:chOff x="0" y="0"/>
+          <a:chExt cx="0" cy="0"/>
+        </a:xfrm>
+      </p:grpSpPr>
+      <p:sp>
+        <p:nvSpPr>
+          <p:cNvPr id="13" name="標題 12"/>
+          <p:cNvSpPr>
+            <a:spLocks noGrp="1"/>
+          </p:cNvSpPr>
+          <p:nvPr>
+            <p:ph type="title"/>
+          </p:nvPr>
+        </p:nvSpPr>
+        <p:spPr>
+          <a:xfrm>
+            <a:off x="4590" y="0"/>
+            <a:ext cx="12153343" cy="970450"/>
+          </a:xfrm>
+        </p:spPr>
+        <p:txBody>
           <a:bodyPr rtlCol="0">
-            <a:normAutofit fontScale="90000"/>
+            <a:noAutofit/>
           </a:bodyPr>
           <a:lstStyle/>
           <a:p>
@@ -13476,7 +13996,23 @@
                 <a:ea typeface="微軟正黑體" panose="020B0604030504040204" pitchFamily="34" charset="-120"/>
                 <a:sym typeface="Salesforce Sans"/>
               </a:rPr>
-              <a:t>What is Gaussian Blur and why need?</a:t>
+              <a:t>What is Gaussian Blur and </a:t>
+            </a:r>
+            <a:r>
+              <a:rPr lang="en-US" altLang="zh-TW" sz="4800" dirty="0" smtClean="0">
+                <a:latin typeface="微軟正黑體" panose="020B0604030504040204" pitchFamily="34" charset="-120"/>
+                <a:ea typeface="微軟正黑體" panose="020B0604030504040204" pitchFamily="34" charset="-120"/>
+                <a:sym typeface="Salesforce Sans"/>
+              </a:rPr>
+              <a:t>why </a:t>
+            </a:r>
+            <a:r>
+              <a:rPr lang="en-US" altLang="zh-TW" sz="4800" dirty="0" smtClean="0">
+                <a:latin typeface="微軟正黑體" panose="020B0604030504040204" pitchFamily="34" charset="-120"/>
+                <a:ea typeface="微軟正黑體" panose="020B0604030504040204" pitchFamily="34" charset="-120"/>
+                <a:sym typeface="Salesforce Sans"/>
+              </a:rPr>
+              <a:t>need?</a:t>
             </a:r>
             <a:endParaRPr lang="zh-TW" altLang="en-US" sz="4800" dirty="0">
               <a:latin typeface="微軟正黑體" panose="020B0604030504040204" pitchFamily="34" charset="-120"/>
@@ -13488,7 +14024,7 @@
       </p:sp>
       <p:sp>
         <p:nvSpPr>
-          <p:cNvPr id="14" name="內容預留位置 13"/>
+          <p:cNvPr id="2" name="內容版面配置區 1"/>
           <p:cNvSpPr>
             <a:spLocks noGrp="1"/>
           </p:cNvSpPr>
@@ -13496,42 +14032,226 @@
             <p:ph idx="1"/>
           </p:nvPr>
         </p:nvSpPr>
-        <p:spPr/>
+        <p:spPr>
+          <a:xfrm>
+            <a:off x="20036" y="970450"/>
+            <a:ext cx="5754130" cy="5638800"/>
+          </a:xfrm>
+        </p:spPr>
         <p:txBody>
-          <a:bodyPr rtlCol="0"/>
+          <a:bodyPr/>
           <a:lstStyle/>
           <a:p>
-            <a:pPr rtl="0"/>
-            <a:r>
-              <a:rPr lang="zh-TW" altLang="en-US" dirty="0">
-                <a:latin typeface="Salesforce Sans"/>
+            <a:r>
+              <a:rPr lang="en-US" sz="2400" dirty="0" smtClean="0">
+                <a:latin typeface="微軟正黑體" panose="020B0604030504040204" pitchFamily="34" charset="-120"/>
                 <a:ea typeface="微軟正黑體" panose="020B0604030504040204" pitchFamily="34" charset="-120"/>
-                <a:sym typeface="Salesforce Sans"/>
               </a:rPr>
-              <a:t>在此新增您的第一個項目符號</a:t>
-            </a:r>
-          </a:p>
-          <a:p>
-            <a:pPr rtl="0"/>
-            <a:r>
-              <a:rPr lang="zh-TW" altLang="en-US" dirty="0">
-                <a:latin typeface="Salesforce Sans"/>
+              <a:t>An image processing algorithm using convolution to </a:t>
+            </a:r>
+            <a:r>
+              <a:rPr lang="en-US" sz="2400" b="1" u="sng" dirty="0" smtClean="0">
+                <a:latin typeface="微軟正黑體" panose="020B0604030504040204" pitchFamily="34" charset="-120"/>
                 <a:ea typeface="微軟正黑體" panose="020B0604030504040204" pitchFamily="34" charset="-120"/>
-                <a:sym typeface="Salesforce Sans"/>
               </a:rPr>
-              <a:t>在此新增您的第二個項目符號</a:t>
-            </a:r>
-          </a:p>
-          <a:p>
-            <a:pPr rtl="0"/>
-            <a:r>
-              <a:rPr lang="zh-TW" altLang="en-US" dirty="0">
-                <a:latin typeface="Salesforce Sans"/>
+              <a:t>smooth images.</a:t>
+            </a:r>
+          </a:p>
+          <a:p>
+            <a:r>
+              <a:rPr lang="en-US" sz="2400" dirty="0" smtClean="0">
+                <a:latin typeface="微軟正黑體" panose="020B0604030504040204" pitchFamily="34" charset="-120"/>
                 <a:ea typeface="微軟正黑體" panose="020B0604030504040204" pitchFamily="34" charset="-120"/>
-                <a:sym typeface="Salesforce Sans"/>
               </a:rPr>
-              <a:t>在此新增您的第三個項目符號</a:t>
-            </a:r>
+              <a:t>Result images varies with filter size and standard deviation of Gaussian Kernel. </a:t>
+            </a:r>
+          </a:p>
+          <a:p>
+            <a:r>
+              <a:rPr lang="en-US" sz="2400" dirty="0" smtClean="0">
+                <a:latin typeface="微軟正黑體" panose="020B0604030504040204" pitchFamily="34" charset="-120"/>
+                <a:ea typeface="微軟正黑體" panose="020B0604030504040204" pitchFamily="34" charset="-120"/>
+              </a:rPr>
+              <a:t>Such algorithm can be used for noise reduction of the image.</a:t>
+            </a:r>
+          </a:p>
+          <a:p>
+            <a:r>
+              <a:rPr lang="en-US" sz="2400" dirty="0" smtClean="0">
+                <a:latin typeface="微軟正黑體" panose="020B0604030504040204" pitchFamily="34" charset="-120"/>
+                <a:ea typeface="微軟正黑體" panose="020B0604030504040204" pitchFamily="34" charset="-120"/>
+              </a:rPr>
+              <a:t>Time complexity is </a:t>
+            </a:r>
+            <a:r>
+              <a:rPr lang="en-US" sz="2400" b="1" dirty="0" smtClean="0">
+                <a:latin typeface="微軟正黑體" panose="020B0604030504040204" pitchFamily="34" charset="-120"/>
+                <a:ea typeface="微軟正黑體" panose="020B0604030504040204" pitchFamily="34" charset="-120"/>
+              </a:rPr>
+              <a:t>O(</a:t>
+            </a:r>
+            <a:r>
+              <a:rPr lang="en-US" sz="2400" b="1" dirty="0" err="1" smtClean="0">
+                <a:latin typeface="微軟正黑體" panose="020B0604030504040204" pitchFamily="34" charset="-120"/>
+                <a:ea typeface="微軟正黑體" panose="020B0604030504040204" pitchFamily="34" charset="-120"/>
+              </a:rPr>
+              <a:t>img_width</a:t>
+            </a:r>
+            <a:r>
+              <a:rPr lang="en-US" sz="2400" b="1" dirty="0" smtClean="0">
+                <a:latin typeface="微軟正黑體" panose="020B0604030504040204" pitchFamily="34" charset="-120"/>
+                <a:ea typeface="微軟正黑體" panose="020B0604030504040204" pitchFamily="34" charset="-120"/>
+              </a:rPr>
+              <a:t> x </a:t>
+            </a:r>
+            <a:r>
+              <a:rPr lang="en-US" sz="2400" b="1" dirty="0" err="1" smtClean="0">
+                <a:latin typeface="微軟正黑體" panose="020B0604030504040204" pitchFamily="34" charset="-120"/>
+                <a:ea typeface="微軟正黑體" panose="020B0604030504040204" pitchFamily="34" charset="-120"/>
+              </a:rPr>
+              <a:t>img_height</a:t>
+            </a:r>
+            <a:r>
+              <a:rPr lang="en-US" sz="2400" b="1" dirty="0" smtClean="0">
+                <a:latin typeface="微軟正黑體" panose="020B0604030504040204" pitchFamily="34" charset="-120"/>
+                <a:ea typeface="微軟正黑體" panose="020B0604030504040204" pitchFamily="34" charset="-120"/>
+              </a:rPr>
+              <a:t> x filter_size^2)</a:t>
+            </a:r>
+          </a:p>
+          <a:p>
+            <a:endParaRPr lang="en-US" dirty="0">
+              <a:latin typeface="微軟正黑體" panose="020B0604030504040204" pitchFamily="34" charset="-120"/>
+              <a:ea typeface="微軟正黑體" panose="020B0604030504040204" pitchFamily="34" charset="-120"/>
+            </a:endParaRPr>
+          </a:p>
+        </p:txBody>
+      </p:sp>
+      <p:pic>
+        <p:nvPicPr>
+          <p:cNvPr id="3" name="圖片 2"/>
+          <p:cNvPicPr>
+            <a:picLocks noChangeAspect="1"/>
+          </p:cNvPicPr>
+          <p:nvPr/>
+        </p:nvPicPr>
+        <p:blipFill>
+          <a:blip r:embed="rId3">
+            <a:extLst>
+              <a:ext uri="{28A0092B-C50C-407E-A947-70E740481C1C}">
+                <a14:useLocalDpi xmlns:a14="http://schemas.microsoft.com/office/drawing/2010/main" val="0"/>
+              </a:ext>
+            </a:extLst>
+          </a:blip>
+          <a:stretch>
+            <a:fillRect/>
+          </a:stretch>
+        </p:blipFill>
+        <p:spPr>
+          <a:xfrm>
+            <a:off x="5789612" y="976628"/>
+            <a:ext cx="3481267" cy="2610950"/>
+          </a:xfrm>
+          <a:prstGeom prst="rect">
+            <a:avLst/>
+          </a:prstGeom>
+        </p:spPr>
+      </p:pic>
+      <p:pic>
+        <p:nvPicPr>
+          <p:cNvPr id="4" name="圖片 3"/>
+          <p:cNvPicPr>
+            <a:picLocks noChangeAspect="1"/>
+          </p:cNvPicPr>
+          <p:nvPr/>
+        </p:nvPicPr>
+        <p:blipFill>
+          <a:blip r:embed="rId4">
+            <a:extLst>
+              <a:ext uri="{28A0092B-C50C-407E-A947-70E740481C1C}">
+                <a14:useLocalDpi xmlns:a14="http://schemas.microsoft.com/office/drawing/2010/main" val="0"/>
+              </a:ext>
+            </a:extLst>
+          </a:blip>
+          <a:stretch>
+            <a:fillRect/>
+          </a:stretch>
+        </p:blipFill>
+        <p:spPr>
+          <a:xfrm>
+            <a:off x="5789612" y="3905987"/>
+            <a:ext cx="3481267" cy="2610950"/>
+          </a:xfrm>
+          <a:prstGeom prst="rect">
+            <a:avLst/>
+          </a:prstGeom>
+        </p:spPr>
+      </p:pic>
+      <p:sp>
+        <p:nvSpPr>
+          <p:cNvPr id="5" name="文字方塊 4"/>
+          <p:cNvSpPr txBox="1"/>
+          <p:nvPr/>
+        </p:nvSpPr>
+        <p:spPr>
+          <a:xfrm>
+            <a:off x="9371012" y="3263653"/>
+            <a:ext cx="2939321" cy="1200329"/>
+          </a:xfrm>
+          <a:prstGeom prst="rect">
+            <a:avLst/>
+          </a:prstGeom>
+          <a:noFill/>
+        </p:spPr>
+        <p:txBody>
+          <a:bodyPr wrap="square" rtlCol="0">
+            <a:spAutoFit/>
+          </a:bodyPr>
+          <a:lstStyle/>
+          <a:p>
+            <a:r>
+              <a:rPr lang="en-US" dirty="0" smtClean="0">
+                <a:latin typeface="微軟正黑體" panose="020B0604030504040204" pitchFamily="34" charset="-120"/>
+                <a:ea typeface="微軟正黑體" panose="020B0604030504040204" pitchFamily="34" charset="-120"/>
+              </a:rPr>
+              <a:t>640 x 480 </a:t>
+            </a:r>
+          </a:p>
+          <a:p>
+            <a:r>
+              <a:rPr lang="en-US" dirty="0" smtClean="0">
+                <a:latin typeface="微軟正黑體" panose="020B0604030504040204" pitchFamily="34" charset="-120"/>
+                <a:ea typeface="微軟正黑體" panose="020B0604030504040204" pitchFamily="34" charset="-120"/>
+              </a:rPr>
+              <a:t>filter size 101 x 101</a:t>
+            </a:r>
+          </a:p>
+          <a:p>
+            <a:r>
+              <a:rPr lang="en-US" dirty="0" err="1">
+                <a:latin typeface="微軟正黑體" panose="020B0604030504040204" pitchFamily="34" charset="-120"/>
+                <a:ea typeface="微軟正黑體" panose="020B0604030504040204" pitchFamily="34" charset="-120"/>
+              </a:rPr>
+              <a:t>s</a:t>
+            </a:r>
+            <a:r>
+              <a:rPr lang="en-US" dirty="0" err="1" smtClean="0">
+                <a:latin typeface="微軟正黑體" panose="020B0604030504040204" pitchFamily="34" charset="-120"/>
+                <a:ea typeface="微軟正黑體" panose="020B0604030504040204" pitchFamily="34" charset="-120"/>
+              </a:rPr>
+              <a:t>tddev</a:t>
+            </a:r>
+            <a:r>
+              <a:rPr lang="en-US" dirty="0" smtClean="0">
+                <a:latin typeface="微軟正黑體" panose="020B0604030504040204" pitchFamily="34" charset="-120"/>
+                <a:ea typeface="微軟正黑體" panose="020B0604030504040204" pitchFamily="34" charset="-120"/>
+              </a:rPr>
+              <a:t>  10</a:t>
+            </a:r>
+            <a:endParaRPr lang="en-US" dirty="0">
+              <a:latin typeface="微軟正黑體" panose="020B0604030504040204" pitchFamily="34" charset="-120"/>
+              <a:ea typeface="微軟正黑體" panose="020B0604030504040204" pitchFamily="34" charset="-120"/>
+            </a:endParaRPr>
           </a:p>
         </p:txBody>
       </p:sp>
@@ -13567,7 +14287,503 @@
 </p:sld>
 </file>
 
-<file path=ppt/slides/slide3.xml><?xml version="1.0" encoding="utf-8"?>
+<file path=ppt/slides/slide4.xml><?xml version="1.0" encoding="utf-8"?>
+<p:sld xmlns:a="http://schemas.openxmlformats.org/drawingml/2006/main" xmlns:r="http://schemas.openxmlformats.org/officeDocument/2006/relationships" xmlns:p="http://schemas.openxmlformats.org/presentationml/2006/main">
+  <p:cSld>
+    <p:spTree>
+      <p:nvGrpSpPr>
+        <p:cNvPr id="1" name=""/>
+        <p:cNvGrpSpPr/>
+        <p:nvPr/>
+      </p:nvGrpSpPr>
+      <p:grpSpPr>
+        <a:xfrm>
+          <a:off x="0" y="0"/>
+          <a:ext cx="0" cy="0"/>
+          <a:chOff x="0" y="0"/>
+          <a:chExt cx="0" cy="0"/>
+        </a:xfrm>
+      </p:grpSpPr>
+      <p:sp>
+        <p:nvSpPr>
+          <p:cNvPr id="2" name="標題 1"/>
+          <p:cNvSpPr>
+            <a:spLocks noGrp="1"/>
+          </p:cNvSpPr>
+          <p:nvPr>
+            <p:ph type="title"/>
+          </p:nvPr>
+        </p:nvSpPr>
+        <p:spPr>
+          <a:xfrm>
+            <a:off x="918147" y="4119"/>
+            <a:ext cx="10351066" cy="970450"/>
+          </a:xfrm>
+        </p:spPr>
+        <p:txBody>
+          <a:bodyPr>
+            <a:normAutofit/>
+          </a:bodyPr>
+          <a:lstStyle/>
+          <a:p>
+            <a:r>
+              <a:rPr lang="en-US" sz="4800" dirty="0" smtClean="0">
+                <a:latin typeface="微軟正黑體" panose="020B0604030504040204" pitchFamily="34" charset="-120"/>
+                <a:ea typeface="微軟正黑體" panose="020B0604030504040204" pitchFamily="34" charset="-120"/>
+              </a:rPr>
+              <a:t>Motivation of this project</a:t>
+            </a:r>
+            <a:endParaRPr lang="en-US" sz="4800" dirty="0">
+              <a:latin typeface="微軟正黑體" panose="020B0604030504040204" pitchFamily="34" charset="-120"/>
+              <a:ea typeface="微軟正黑體" panose="020B0604030504040204" pitchFamily="34" charset="-120"/>
+            </a:endParaRPr>
+          </a:p>
+        </p:txBody>
+      </p:sp>
+      <p:sp>
+        <p:nvSpPr>
+          <p:cNvPr id="3" name="內容版面配置區 2"/>
+          <p:cNvSpPr>
+            <a:spLocks noGrp="1"/>
+          </p:cNvSpPr>
+          <p:nvPr>
+            <p:ph idx="1"/>
+          </p:nvPr>
+        </p:nvSpPr>
+        <p:spPr>
+          <a:xfrm>
+            <a:off x="0" y="937499"/>
+            <a:ext cx="5713412" cy="5844301"/>
+          </a:xfrm>
+        </p:spPr>
+        <p:txBody>
+          <a:bodyPr>
+            <a:normAutofit/>
+          </a:bodyPr>
+          <a:lstStyle/>
+          <a:p>
+            <a:r>
+              <a:rPr lang="en-US" sz="2400" dirty="0" smtClean="0">
+                <a:latin typeface="微軟正黑體" panose="020B0604030504040204" pitchFamily="34" charset="-120"/>
+                <a:ea typeface="微軟正黑體" panose="020B0604030504040204" pitchFamily="34" charset="-120"/>
+              </a:rPr>
+              <a:t>Widely used algorithm in lots of software like </a:t>
+            </a:r>
+            <a:r>
+              <a:rPr lang="en-US" sz="2400" dirty="0" err="1" smtClean="0">
+                <a:latin typeface="微軟正黑體" panose="020B0604030504040204" pitchFamily="34" charset="-120"/>
+                <a:ea typeface="微軟正黑體" panose="020B0604030504040204" pitchFamily="34" charset="-120"/>
+              </a:rPr>
+              <a:t>PhotoShop</a:t>
+            </a:r>
+            <a:r>
+              <a:rPr lang="en-US" sz="2400" dirty="0" smtClean="0">
+                <a:latin typeface="微軟正黑體" panose="020B0604030504040204" pitchFamily="34" charset="-120"/>
+                <a:ea typeface="微軟正黑體" panose="020B0604030504040204" pitchFamily="34" charset="-120"/>
+              </a:rPr>
+              <a:t>, GIMP.</a:t>
+            </a:r>
+          </a:p>
+          <a:p>
+            <a:r>
+              <a:rPr lang="en-US" sz="2400" dirty="0" smtClean="0">
+                <a:latin typeface="微軟正黑體" panose="020B0604030504040204" pitchFamily="34" charset="-120"/>
+                <a:ea typeface="微軟正黑體" panose="020B0604030504040204" pitchFamily="34" charset="-120"/>
+              </a:rPr>
+              <a:t>Due to convolution, the compute complexity is </a:t>
+            </a:r>
+            <a:r>
+              <a:rPr lang="en-US" sz="2400" b="1" u="sng" dirty="0" smtClean="0">
+                <a:latin typeface="微軟正黑體" panose="020B0604030504040204" pitchFamily="34" charset="-120"/>
+                <a:ea typeface="微軟正黑體" panose="020B0604030504040204" pitchFamily="34" charset="-120"/>
+              </a:rPr>
+              <a:t>extremely high.</a:t>
+            </a:r>
+          </a:p>
+          <a:p>
+            <a:r>
+              <a:rPr lang="en-US" sz="2400" dirty="0" smtClean="0">
+                <a:latin typeface="微軟正黑體" panose="020B0604030504040204" pitchFamily="34" charset="-120"/>
+                <a:ea typeface="微軟正黑體" panose="020B0604030504040204" pitchFamily="34" charset="-120"/>
+              </a:rPr>
+              <a:t>Beside the well-known </a:t>
+            </a:r>
+            <a:r>
+              <a:rPr lang="en-US" sz="2400" dirty="0" smtClean="0">
+                <a:solidFill>
+                  <a:srgbClr val="00B0F0"/>
+                </a:solidFill>
+                <a:latin typeface="微軟正黑體" panose="020B0604030504040204" pitchFamily="34" charset="-120"/>
+                <a:ea typeface="微軟正黑體" panose="020B0604030504040204" pitchFamily="34" charset="-120"/>
+              </a:rPr>
+              <a:t>POSIX thread</a:t>
+            </a:r>
+            <a:r>
+              <a:rPr lang="en-US" sz="2400" dirty="0" smtClean="0">
+                <a:latin typeface="微軟正黑體" panose="020B0604030504040204" pitchFamily="34" charset="-120"/>
+                <a:ea typeface="微軟正黑體" panose="020B0604030504040204" pitchFamily="34" charset="-120"/>
+              </a:rPr>
+              <a:t> ,with an eye to try parallel on </a:t>
+            </a:r>
+            <a:r>
+              <a:rPr lang="en-US" sz="2400" dirty="0" err="1" smtClean="0">
+                <a:solidFill>
+                  <a:srgbClr val="00B0F0"/>
+                </a:solidFill>
+                <a:latin typeface="微軟正黑體" panose="020B0604030504040204" pitchFamily="34" charset="-120"/>
+                <a:ea typeface="微軟正黑體" panose="020B0604030504040204" pitchFamily="34" charset="-120"/>
+              </a:rPr>
+              <a:t>OpenMP</a:t>
+            </a:r>
+            <a:r>
+              <a:rPr lang="en-US" sz="2400" dirty="0" smtClean="0">
+                <a:latin typeface="微軟正黑體" panose="020B0604030504040204" pitchFamily="34" charset="-120"/>
+                <a:ea typeface="微軟正黑體" panose="020B0604030504040204" pitchFamily="34" charset="-120"/>
+              </a:rPr>
+              <a:t> where both computes with </a:t>
+            </a:r>
+            <a:r>
+              <a:rPr lang="en-US" sz="2400" dirty="0" smtClean="0">
+                <a:solidFill>
+                  <a:srgbClr val="00B0F0"/>
+                </a:solidFill>
+                <a:latin typeface="微軟正黑體" panose="020B0604030504040204" pitchFamily="34" charset="-120"/>
+                <a:ea typeface="微軟正黑體" panose="020B0604030504040204" pitchFamily="34" charset="-120"/>
+              </a:rPr>
+              <a:t>CPU</a:t>
+            </a:r>
+            <a:r>
+              <a:rPr lang="en-US" sz="2400" dirty="0" smtClean="0">
+                <a:latin typeface="微軟正黑體" panose="020B0604030504040204" pitchFamily="34" charset="-120"/>
+                <a:ea typeface="微軟正黑體" panose="020B0604030504040204" pitchFamily="34" charset="-120"/>
+              </a:rPr>
+              <a:t>.</a:t>
+            </a:r>
+          </a:p>
+          <a:p>
+            <a:r>
+              <a:rPr lang="en-US" sz="2400" b="1" u="sng" dirty="0" smtClean="0">
+                <a:solidFill>
+                  <a:srgbClr val="FF0000"/>
+                </a:solidFill>
+                <a:effectLst/>
+                <a:latin typeface="微軟正黑體" panose="020B0604030504040204" pitchFamily="34" charset="-120"/>
+                <a:ea typeface="微軟正黑體" panose="020B0604030504040204" pitchFamily="34" charset="-120"/>
+              </a:rPr>
+              <a:t>Heterogeneous computation: </a:t>
+            </a:r>
+            <a:r>
+              <a:rPr lang="en-US" sz="2400" dirty="0" smtClean="0">
+                <a:solidFill>
+                  <a:schemeClr val="tx1"/>
+                </a:solidFill>
+                <a:effectLst/>
+                <a:latin typeface="微軟正黑體" panose="020B0604030504040204" pitchFamily="34" charset="-120"/>
+                <a:ea typeface="微軟正黑體" panose="020B0604030504040204" pitchFamily="34" charset="-120"/>
+              </a:rPr>
+              <a:t>Use </a:t>
+            </a:r>
+            <a:r>
+              <a:rPr lang="en-US" sz="2400" dirty="0" smtClean="0">
+                <a:solidFill>
+                  <a:srgbClr val="FF0000"/>
+                </a:solidFill>
+                <a:effectLst/>
+                <a:latin typeface="微軟正黑體" panose="020B0604030504040204" pitchFamily="34" charset="-120"/>
+                <a:ea typeface="微軟正黑體" panose="020B0604030504040204" pitchFamily="34" charset="-120"/>
+              </a:rPr>
+              <a:t>more than one kind </a:t>
+            </a:r>
+            <a:r>
+              <a:rPr lang="en-US" sz="2400" dirty="0" smtClean="0">
+                <a:solidFill>
+                  <a:schemeClr val="tx1"/>
+                </a:solidFill>
+                <a:effectLst/>
+                <a:latin typeface="微軟正黑體" panose="020B0604030504040204" pitchFamily="34" charset="-120"/>
+                <a:ea typeface="微軟正黑體" panose="020B0604030504040204" pitchFamily="34" charset="-120"/>
+              </a:rPr>
+              <a:t>of processors, </a:t>
+            </a:r>
+            <a:r>
+              <a:rPr lang="en-US" sz="2400" dirty="0" smtClean="0">
+                <a:solidFill>
+                  <a:srgbClr val="FF0000"/>
+                </a:solidFill>
+                <a:effectLst/>
+                <a:latin typeface="微軟正黑體" panose="020B0604030504040204" pitchFamily="34" charset="-120"/>
+                <a:ea typeface="微軟正黑體" panose="020B0604030504040204" pitchFamily="34" charset="-120"/>
+              </a:rPr>
+              <a:t>co-processing</a:t>
+            </a:r>
+            <a:r>
+              <a:rPr lang="en-US" sz="2400" dirty="0" smtClean="0">
+                <a:solidFill>
+                  <a:schemeClr val="tx1"/>
+                </a:solidFill>
+                <a:effectLst/>
+                <a:latin typeface="微軟正黑體" panose="020B0604030504040204" pitchFamily="34" charset="-120"/>
+                <a:ea typeface="微軟正黑體" panose="020B0604030504040204" pitchFamily="34" charset="-120"/>
+              </a:rPr>
+              <a:t> to gain </a:t>
+            </a:r>
+            <a:r>
+              <a:rPr lang="en-US" sz="2400" dirty="0" smtClean="0">
+                <a:solidFill>
+                  <a:srgbClr val="FF0000"/>
+                </a:solidFill>
+                <a:effectLst/>
+                <a:latin typeface="微軟正黑體" panose="020B0604030504040204" pitchFamily="34" charset="-120"/>
+                <a:ea typeface="微軟正黑體" panose="020B0604030504040204" pitchFamily="34" charset="-120"/>
+              </a:rPr>
+              <a:t>significantly performance improvement </a:t>
+            </a:r>
+            <a:r>
+              <a:rPr lang="en-US" sz="2400" dirty="0" smtClean="0">
+                <a:solidFill>
+                  <a:schemeClr val="tx1"/>
+                </a:solidFill>
+                <a:effectLst/>
+                <a:latin typeface="微軟正黑體" panose="020B0604030504040204" pitchFamily="34" charset="-120"/>
+                <a:ea typeface="微軟正黑體" panose="020B0604030504040204" pitchFamily="34" charset="-120"/>
+              </a:rPr>
+              <a:t>such as </a:t>
+            </a:r>
+            <a:r>
+              <a:rPr lang="en-US" sz="2400" dirty="0" smtClean="0">
+                <a:solidFill>
+                  <a:srgbClr val="FF0000"/>
+                </a:solidFill>
+                <a:effectLst/>
+                <a:latin typeface="微軟正黑體" panose="020B0604030504040204" pitchFamily="34" charset="-120"/>
+                <a:ea typeface="微軟正黑體" panose="020B0604030504040204" pitchFamily="34" charset="-120"/>
+              </a:rPr>
+              <a:t>CUDA</a:t>
+            </a:r>
+            <a:r>
+              <a:rPr lang="en-US" sz="2400" dirty="0" smtClean="0">
+                <a:solidFill>
+                  <a:schemeClr val="tx1"/>
+                </a:solidFill>
+                <a:effectLst/>
+                <a:latin typeface="微軟正黑體" panose="020B0604030504040204" pitchFamily="34" charset="-120"/>
+                <a:ea typeface="微軟正黑體" panose="020B0604030504040204" pitchFamily="34" charset="-120"/>
+              </a:rPr>
+              <a:t> and </a:t>
+            </a:r>
+            <a:r>
+              <a:rPr lang="en-US" sz="2400" dirty="0" smtClean="0">
+                <a:solidFill>
+                  <a:srgbClr val="FF0000"/>
+                </a:solidFill>
+                <a:effectLst/>
+                <a:latin typeface="微軟正黑體" panose="020B0604030504040204" pitchFamily="34" charset="-120"/>
+                <a:ea typeface="微軟正黑體" panose="020B0604030504040204" pitchFamily="34" charset="-120"/>
+              </a:rPr>
+              <a:t>OpenCL</a:t>
+            </a:r>
+            <a:r>
+              <a:rPr lang="en-US" sz="2400" dirty="0" smtClean="0">
+                <a:solidFill>
+                  <a:schemeClr val="tx1"/>
+                </a:solidFill>
+                <a:effectLst/>
+                <a:latin typeface="微軟正黑體" panose="020B0604030504040204" pitchFamily="34" charset="-120"/>
+                <a:ea typeface="微軟正黑體" panose="020B0604030504040204" pitchFamily="34" charset="-120"/>
+              </a:rPr>
+              <a:t> </a:t>
+            </a:r>
+          </a:p>
+          <a:p>
+            <a:endParaRPr lang="en-US" sz="2400" dirty="0" smtClean="0">
+              <a:latin typeface="微軟正黑體" panose="020B0604030504040204" pitchFamily="34" charset="-120"/>
+              <a:ea typeface="微軟正黑體" panose="020B0604030504040204" pitchFamily="34" charset="-120"/>
+            </a:endParaRPr>
+          </a:p>
+          <a:p>
+            <a:endParaRPr lang="en-US" sz="2400" dirty="0" smtClean="0">
+              <a:latin typeface="微軟正黑體" panose="020B0604030504040204" pitchFamily="34" charset="-120"/>
+              <a:ea typeface="微軟正黑體" panose="020B0604030504040204" pitchFamily="34" charset="-120"/>
+            </a:endParaRPr>
+          </a:p>
+          <a:p>
+            <a:endParaRPr lang="en-US" sz="2400" dirty="0" smtClean="0">
+              <a:latin typeface="微軟正黑體" panose="020B0604030504040204" pitchFamily="34" charset="-120"/>
+              <a:ea typeface="微軟正黑體" panose="020B0604030504040204" pitchFamily="34" charset="-120"/>
+            </a:endParaRPr>
+          </a:p>
+          <a:p>
+            <a:endParaRPr lang="en-US" sz="2400" dirty="0">
+              <a:latin typeface="微軟正黑體" panose="020B0604030504040204" pitchFamily="34" charset="-120"/>
+              <a:ea typeface="微軟正黑體" panose="020B0604030504040204" pitchFamily="34" charset="-120"/>
+            </a:endParaRPr>
+          </a:p>
+        </p:txBody>
+      </p:sp>
+      <p:pic>
+        <p:nvPicPr>
+          <p:cNvPr id="4" name="圖片 3"/>
+          <p:cNvPicPr>
+            <a:picLocks noChangeAspect="1"/>
+          </p:cNvPicPr>
+          <p:nvPr/>
+        </p:nvPicPr>
+        <p:blipFill>
+          <a:blip r:embed="rId2">
+            <a:extLst>
+              <a:ext uri="{28A0092B-C50C-407E-A947-70E740481C1C}">
+                <a14:useLocalDpi xmlns:a14="http://schemas.microsoft.com/office/drawing/2010/main" val="0"/>
+              </a:ext>
+            </a:extLst>
+          </a:blip>
+          <a:stretch>
+            <a:fillRect/>
+          </a:stretch>
+        </p:blipFill>
+        <p:spPr>
+          <a:xfrm>
+            <a:off x="6011872" y="962213"/>
+            <a:ext cx="6026139" cy="4649478"/>
+          </a:xfrm>
+          <a:prstGeom prst="rect">
+            <a:avLst/>
+          </a:prstGeom>
+        </p:spPr>
+      </p:pic>
+      <p:sp>
+        <p:nvSpPr>
+          <p:cNvPr id="5" name="文字方塊 4"/>
+          <p:cNvSpPr txBox="1"/>
+          <p:nvPr/>
+        </p:nvSpPr>
+        <p:spPr>
+          <a:xfrm>
+            <a:off x="6014404" y="5746338"/>
+            <a:ext cx="6174421" cy="830997"/>
+          </a:xfrm>
+          <a:prstGeom prst="rect">
+            <a:avLst/>
+          </a:prstGeom>
+          <a:noFill/>
+        </p:spPr>
+        <p:txBody>
+          <a:bodyPr wrap="square" rtlCol="0">
+            <a:spAutoFit/>
+          </a:bodyPr>
+          <a:lstStyle/>
+          <a:p>
+            <a:r>
+              <a:rPr lang="en-US" dirty="0" smtClean="0">
+                <a:latin typeface="微軟正黑體" panose="020B0604030504040204" pitchFamily="34" charset="-120"/>
+                <a:ea typeface="微軟正黑體" panose="020B0604030504040204" pitchFamily="34" charset="-120"/>
+              </a:rPr>
+              <a:t>Gaussian Convolution  with its kernel</a:t>
+            </a:r>
+          </a:p>
+          <a:p>
+            <a:r>
+              <a:rPr lang="en-US" dirty="0" err="1" smtClean="0">
+                <a:latin typeface="微軟正黑體" panose="020B0604030504040204" pitchFamily="34" charset="-120"/>
+                <a:ea typeface="微軟正黑體" panose="020B0604030504040204" pitchFamily="34" charset="-120"/>
+                <a:hlinkClick r:id="rId3"/>
+              </a:rPr>
+              <a:t>Img</a:t>
+            </a:r>
+            <a:r>
+              <a:rPr lang="en-US" dirty="0" smtClean="0">
+                <a:latin typeface="微軟正黑體" panose="020B0604030504040204" pitchFamily="34" charset="-120"/>
+                <a:ea typeface="微軟正黑體" panose="020B0604030504040204" pitchFamily="34" charset="-120"/>
+                <a:hlinkClick r:id="rId3"/>
+              </a:rPr>
+              <a:t> source</a:t>
+            </a:r>
+            <a:endParaRPr lang="en-US" dirty="0">
+              <a:latin typeface="微軟正黑體" panose="020B0604030504040204" pitchFamily="34" charset="-120"/>
+              <a:ea typeface="微軟正黑體" panose="020B0604030504040204" pitchFamily="34" charset="-120"/>
+            </a:endParaRPr>
+          </a:p>
+        </p:txBody>
+      </p:sp>
+    </p:spTree>
+    <p:extLst>
+      <p:ext uri="{BB962C8B-B14F-4D97-AF65-F5344CB8AC3E}">
+        <p14:creationId xmlns:p14="http://schemas.microsoft.com/office/powerpoint/2010/main" val="4262106015"/>
+      </p:ext>
+    </p:extLst>
+  </p:cSld>
+  <p:clrMapOvr>
+    <a:masterClrMapping/>
+  </p:clrMapOvr>
+</p:sld>
+</file>
+
+<file path=ppt/slides/slide5.xml><?xml version="1.0" encoding="utf-8"?>
+<p:sld xmlns:a="http://schemas.openxmlformats.org/drawingml/2006/main" xmlns:r="http://schemas.openxmlformats.org/officeDocument/2006/relationships" xmlns:p="http://schemas.openxmlformats.org/presentationml/2006/main">
+  <p:cSld>
+    <p:spTree>
+      <p:nvGrpSpPr>
+        <p:cNvPr id="1" name=""/>
+        <p:cNvGrpSpPr/>
+        <p:nvPr/>
+      </p:nvGrpSpPr>
+      <p:grpSpPr>
+        <a:xfrm>
+          <a:off x="0" y="0"/>
+          <a:ext cx="0" cy="0"/>
+          <a:chOff x="0" y="0"/>
+          <a:chExt cx="0" cy="0"/>
+        </a:xfrm>
+      </p:grpSpPr>
+      <p:sp>
+        <p:nvSpPr>
+          <p:cNvPr id="2" name="標題 1"/>
+          <p:cNvSpPr>
+            <a:spLocks noGrp="1"/>
+          </p:cNvSpPr>
+          <p:nvPr>
+            <p:ph type="title"/>
+          </p:nvPr>
+        </p:nvSpPr>
+        <p:spPr>
+          <a:xfrm>
+            <a:off x="913557" y="76200"/>
+            <a:ext cx="10351066" cy="970450"/>
+          </a:xfrm>
+        </p:spPr>
+        <p:txBody>
+          <a:bodyPr>
+            <a:normAutofit/>
+          </a:bodyPr>
+          <a:lstStyle/>
+          <a:p>
+            <a:r>
+              <a:rPr lang="en-US" sz="4800" dirty="0" smtClean="0">
+                <a:latin typeface="微軟正黑體" panose="020B0604030504040204" pitchFamily="34" charset="-120"/>
+                <a:ea typeface="微軟正黑體" panose="020B0604030504040204" pitchFamily="34" charset="-120"/>
+              </a:rPr>
+              <a:t>Hardware for this project</a:t>
+            </a:r>
+            <a:endParaRPr lang="en-US" sz="4800" dirty="0">
+              <a:latin typeface="微軟正黑體" panose="020B0604030504040204" pitchFamily="34" charset="-120"/>
+              <a:ea typeface="微軟正黑體" panose="020B0604030504040204" pitchFamily="34" charset="-120"/>
+            </a:endParaRPr>
+          </a:p>
+        </p:txBody>
+      </p:sp>
+    </p:spTree>
+    <p:extLst>
+      <p:ext uri="{BB962C8B-B14F-4D97-AF65-F5344CB8AC3E}">
+        <p14:creationId xmlns:p14="http://schemas.microsoft.com/office/powerpoint/2010/main" val="3635218041"/>
+      </p:ext>
+    </p:extLst>
+  </p:cSld>
+  <p:clrMapOvr>
+    <a:masterClrMapping/>
+  </p:clrMapOvr>
+</p:sld>
+</file>
+
+<file path=ppt/slides/slide6.xml><?xml version="1.0" encoding="utf-8"?>
 <p:sld xmlns:a="http://schemas.openxmlformats.org/drawingml/2006/main" xmlns:r="http://schemas.openxmlformats.org/officeDocument/2006/relationships" xmlns:p="http://schemas.openxmlformats.org/presentationml/2006/main">
   <p:cSld>
     <p:spTree>
@@ -13666,7 +14882,7 @@
 </p:sld>
 </file>
 
-<file path=ppt/slides/slide4.xml><?xml version="1.0" encoding="utf-8"?>
+<file path=ppt/slides/slide7.xml><?xml version="1.0" encoding="utf-8"?>
 <p:sld xmlns:a="http://schemas.openxmlformats.org/drawingml/2006/main" xmlns:r="http://schemas.openxmlformats.org/officeDocument/2006/relationships" xmlns:p="http://schemas.openxmlformats.org/presentationml/2006/main">
   <p:cSld>
     <p:spTree>
@@ -14202,421 +15418,6 @@
 </p:sld>
 </file>
 
-<file path=ppt/slides/slide5.xml><?xml version="1.0" encoding="utf-8"?>
-<p:sld xmlns:a="http://schemas.openxmlformats.org/drawingml/2006/main" xmlns:r="http://schemas.openxmlformats.org/officeDocument/2006/relationships" xmlns:p="http://schemas.openxmlformats.org/presentationml/2006/main">
-  <p:cSld>
-    <p:spTree>
-      <p:nvGrpSpPr>
-        <p:cNvPr id="1" name=""/>
-        <p:cNvGrpSpPr/>
-        <p:nvPr/>
-      </p:nvGrpSpPr>
-      <p:grpSpPr>
-        <a:xfrm>
-          <a:off x="0" y="0"/>
-          <a:ext cx="0" cy="0"/>
-          <a:chOff x="0" y="0"/>
-          <a:chExt cx="0" cy="0"/>
-        </a:xfrm>
-      </p:grpSpPr>
-      <p:sp>
-        <p:nvSpPr>
-          <p:cNvPr id="2" name="標題 1"/>
-          <p:cNvSpPr>
-            <a:spLocks noGrp="1"/>
-          </p:cNvSpPr>
-          <p:nvPr>
-            <p:ph type="title"/>
-          </p:nvPr>
-        </p:nvSpPr>
-        <p:spPr/>
-        <p:txBody>
-          <a:bodyPr rtlCol="0"/>
-          <a:lstStyle/>
-          <a:p>
-            <a:pPr rtl="0"/>
-            <a:r>
-              <a:rPr lang="zh-TW" altLang="en-US" dirty="0" smtClean="0">
-                <a:sym typeface="Salesforce Sans"/>
-              </a:rPr>
-              <a:t>含 </a:t>
-            </a:r>
-            <a:r>
-              <a:rPr lang="en-US" altLang="zh-TW" dirty="0" smtClean="0">
-                <a:sym typeface="Salesforce Sans"/>
-              </a:rPr>
-              <a:t>SmartArt </a:t>
-            </a:r>
-            <a:r>
-              <a:rPr lang="zh-TW" altLang="en-US" dirty="0" smtClean="0">
-                <a:sym typeface="Salesforce Sans"/>
-              </a:rPr>
-              <a:t>的兩項內容版面配置</a:t>
-            </a:r>
-            <a:endParaRPr lang="zh-TW" altLang="en-US" dirty="0">
-              <a:sym typeface="Salesforce Sans"/>
-            </a:endParaRPr>
-          </a:p>
-        </p:txBody>
-      </p:sp>
-      <p:sp>
-        <p:nvSpPr>
-          <p:cNvPr id="3" name="內容預留位置 2"/>
-          <p:cNvSpPr>
-            <a:spLocks noGrp="1"/>
-          </p:cNvSpPr>
-          <p:nvPr>
-            <p:ph sz="half" idx="1"/>
-          </p:nvPr>
-        </p:nvSpPr>
-        <p:spPr/>
-        <p:txBody>
-          <a:bodyPr rtlCol="0"/>
-          <a:lstStyle/>
-          <a:p>
-            <a:pPr rtl="0"/>
-            <a:r>
-              <a:rPr lang="zh-TW" altLang="en-US" dirty="0" smtClean="0">
-                <a:sym typeface="Salesforce Sans"/>
-              </a:rPr>
-              <a:t>第一個項目符號</a:t>
-            </a:r>
-          </a:p>
-          <a:p>
-            <a:pPr rtl="0"/>
-            <a:r>
-              <a:rPr lang="zh-TW" altLang="en-US" dirty="0" smtClean="0">
-                <a:sym typeface="Salesforce Sans"/>
-              </a:rPr>
-              <a:t>第二個項目符號</a:t>
-            </a:r>
-          </a:p>
-          <a:p>
-            <a:pPr rtl="0"/>
-            <a:r>
-              <a:rPr lang="zh-TW" altLang="en-US" dirty="0" smtClean="0">
-                <a:sym typeface="Salesforce Sans"/>
-              </a:rPr>
-              <a:t>第三個項目符號</a:t>
-            </a:r>
-            <a:endParaRPr lang="zh-TW" altLang="en-US" dirty="0">
-              <a:sym typeface="Salesforce Sans"/>
-            </a:endParaRPr>
-          </a:p>
-        </p:txBody>
-      </p:sp>
-      <p:graphicFrame>
-        <p:nvGraphicFramePr>
-          <p:cNvPr id="5" name="內容預留位置 4" descr="由上至下依序顯示 3 項工作的交錯流程圖，兩個向下箭號用來表示由第一項工作到第二項工作，再由第二項工作到第三項工作的進程。"/>
-          <p:cNvGraphicFramePr>
-            <a:graphicFrameLocks noGrp="1"/>
-          </p:cNvGraphicFramePr>
-          <p:nvPr>
-            <p:ph sz="half" idx="2"/>
-            <p:extLst>
-              <p:ext uri="{D42A27DB-BD31-4B8C-83A1-F6EECF244321}">
-                <p14:modId xmlns:p14="http://schemas.microsoft.com/office/powerpoint/2010/main" val="2150814564"/>
-              </p:ext>
-            </p:extLst>
-          </p:nvPr>
-        </p:nvGraphicFramePr>
-        <p:xfrm>
-          <a:off x="6200775" y="1731963"/>
-          <a:ext cx="5064125" cy="4059237"/>
-        </p:xfrm>
-        <a:graphic>
-          <a:graphicData uri="http://schemas.openxmlformats.org/drawingml/2006/diagram">
-            <dgm:relIds xmlns:dgm="http://schemas.openxmlformats.org/drawingml/2006/diagram" xmlns:r="http://schemas.openxmlformats.org/officeDocument/2006/relationships" r:dm="rId3" r:lo="rId4" r:qs="rId5" r:cs="rId6"/>
-          </a:graphicData>
-        </a:graphic>
-      </p:graphicFrame>
-    </p:spTree>
-    <p:extLst>
-      <p:ext uri="{BB962C8B-B14F-4D97-AF65-F5344CB8AC3E}">
-        <p14:creationId xmlns:p14="http://schemas.microsoft.com/office/powerpoint/2010/main" val="4123189245"/>
-      </p:ext>
-    </p:extLst>
-  </p:cSld>
-  <p:clrMapOvr>
-    <a:masterClrMapping/>
-  </p:clrMapOvr>
-  <mc:AlternateContent xmlns:mc="http://schemas.openxmlformats.org/markup-compatibility/2006" xmlns:p14="http://schemas.microsoft.com/office/powerpoint/2010/main">
-    <mc:Choice Requires="p14">
-      <p:transition spd="med" p14:dur="700">
-        <p:fade/>
-      </p:transition>
-    </mc:Choice>
-    <mc:Fallback xmlns="">
-      <p:transition spd="med">
-        <p:fade/>
-      </p:transition>
-    </mc:Fallback>
-  </mc:AlternateContent>
-</p:sld>
-</file>
-
-<file path=ppt/slides/slide6.xml><?xml version="1.0" encoding="utf-8"?>
-<p:sld xmlns:a="http://schemas.openxmlformats.org/drawingml/2006/main" xmlns:r="http://schemas.openxmlformats.org/officeDocument/2006/relationships" xmlns:p="http://schemas.openxmlformats.org/presentationml/2006/main">
-  <p:cSld>
-    <p:spTree>
-      <p:nvGrpSpPr>
-        <p:cNvPr id="1" name=""/>
-        <p:cNvGrpSpPr/>
-        <p:nvPr/>
-      </p:nvGrpSpPr>
-      <p:grpSpPr>
-        <a:xfrm>
-          <a:off x="0" y="0"/>
-          <a:ext cx="0" cy="0"/>
-          <a:chOff x="0" y="0"/>
-          <a:chExt cx="0" cy="0"/>
-        </a:xfrm>
-      </p:grpSpPr>
-      <p:sp>
-        <p:nvSpPr>
-          <p:cNvPr id="4" name="標題 3"/>
-          <p:cNvSpPr>
-            <a:spLocks noGrp="1"/>
-          </p:cNvSpPr>
-          <p:nvPr>
-            <p:ph type="title"/>
-          </p:nvPr>
-        </p:nvSpPr>
-        <p:spPr/>
-        <p:txBody>
-          <a:bodyPr rtlCol="0"/>
-          <a:lstStyle/>
-          <a:p>
-            <a:pPr rtl="0"/>
-            <a:r>
-              <a:rPr lang="zh-TW" altLang="en-US" dirty="0" smtClean="0">
-                <a:sym typeface="Salesforce Sans"/>
-              </a:rPr>
-              <a:t>新增投影片標題 </a:t>
-            </a:r>
-            <a:r>
-              <a:rPr lang="en-US" altLang="zh-TW" dirty="0" smtClean="0">
-                <a:sym typeface="Salesforce Sans"/>
-              </a:rPr>
-              <a:t>- 1</a:t>
-            </a:r>
-            <a:endParaRPr lang="zh-TW" altLang="en-US" dirty="0">
-              <a:sym typeface="Salesforce Sans"/>
-            </a:endParaRPr>
-          </a:p>
-        </p:txBody>
-      </p:sp>
-      <p:sp>
-        <p:nvSpPr>
-          <p:cNvPr id="5" name="文字預留位置 4"/>
-          <p:cNvSpPr>
-            <a:spLocks noGrp="1"/>
-          </p:cNvSpPr>
-          <p:nvPr>
-            <p:ph type="body" idx="1"/>
-          </p:nvPr>
-        </p:nvSpPr>
-        <p:spPr/>
-        <p:txBody>
-          <a:bodyPr rtlCol="0"/>
-          <a:lstStyle/>
-          <a:p>
-            <a:pPr rtl="0"/>
-            <a:endParaRPr lang="zh-TW" altLang="en-US" dirty="0">
-              <a:sym typeface="Salesforce Sans"/>
-            </a:endParaRPr>
-          </a:p>
-        </p:txBody>
-      </p:sp>
-    </p:spTree>
-    <p:extLst>
-      <p:ext uri="{BB962C8B-B14F-4D97-AF65-F5344CB8AC3E}">
-        <p14:creationId xmlns:p14="http://schemas.microsoft.com/office/powerpoint/2010/main" val="4264977537"/>
-      </p:ext>
-    </p:extLst>
-  </p:cSld>
-  <p:clrMapOvr>
-    <a:masterClrMapping/>
-  </p:clrMapOvr>
-  <mc:AlternateContent xmlns:mc="http://schemas.openxmlformats.org/markup-compatibility/2006" xmlns:p14="http://schemas.microsoft.com/office/powerpoint/2010/main">
-    <mc:Choice Requires="p14">
-      <p:transition spd="med" p14:dur="700">
-        <p:fade/>
-      </p:transition>
-    </mc:Choice>
-    <mc:Fallback xmlns="">
-      <p:transition spd="med">
-        <p:fade/>
-      </p:transition>
-    </mc:Fallback>
-  </mc:AlternateContent>
-</p:sld>
-</file>
-
-<file path=ppt/slides/slide7.xml><?xml version="1.0" encoding="utf-8"?>
-<p:sld xmlns:a="http://schemas.openxmlformats.org/drawingml/2006/main" xmlns:r="http://schemas.openxmlformats.org/officeDocument/2006/relationships" xmlns:p="http://schemas.openxmlformats.org/presentationml/2006/main">
-  <p:cSld>
-    <p:spTree>
-      <p:nvGrpSpPr>
-        <p:cNvPr id="1" name=""/>
-        <p:cNvGrpSpPr/>
-        <p:nvPr/>
-      </p:nvGrpSpPr>
-      <p:grpSpPr>
-        <a:xfrm>
-          <a:off x="0" y="0"/>
-          <a:ext cx="0" cy="0"/>
-          <a:chOff x="0" y="0"/>
-          <a:chExt cx="0" cy="0"/>
-        </a:xfrm>
-      </p:grpSpPr>
-      <p:sp>
-        <p:nvSpPr>
-          <p:cNvPr id="7" name="標題 6"/>
-          <p:cNvSpPr>
-            <a:spLocks noGrp="1"/>
-          </p:cNvSpPr>
-          <p:nvPr>
-            <p:ph type="title"/>
-          </p:nvPr>
-        </p:nvSpPr>
-        <p:spPr/>
-        <p:txBody>
-          <a:bodyPr rtlCol="0"/>
-          <a:lstStyle/>
-          <a:p>
-            <a:pPr rtl="0"/>
-            <a:r>
-              <a:rPr lang="zh-TW" altLang="en-US" dirty="0" smtClean="0">
-                <a:sym typeface="Salesforce Sans"/>
-              </a:rPr>
-              <a:t>新增投影片標題 </a:t>
-            </a:r>
-            <a:r>
-              <a:rPr lang="en-US" altLang="zh-TW" dirty="0" smtClean="0">
-                <a:sym typeface="Salesforce Sans"/>
-              </a:rPr>
-              <a:t>- 2</a:t>
-            </a:r>
-            <a:endParaRPr lang="zh-TW" altLang="en-US" dirty="0">
-              <a:sym typeface="Salesforce Sans"/>
-            </a:endParaRPr>
-          </a:p>
-        </p:txBody>
-      </p:sp>
-      <p:sp>
-        <p:nvSpPr>
-          <p:cNvPr id="8" name="文字預留位置 7"/>
-          <p:cNvSpPr>
-            <a:spLocks noGrp="1"/>
-          </p:cNvSpPr>
-          <p:nvPr>
-            <p:ph type="body" idx="1"/>
-          </p:nvPr>
-        </p:nvSpPr>
-        <p:spPr/>
-        <p:txBody>
-          <a:bodyPr rtlCol="0"/>
-          <a:lstStyle/>
-          <a:p>
-            <a:pPr rtl="0"/>
-            <a:endParaRPr lang="zh-TW" altLang="en-US" dirty="0">
-              <a:sym typeface="Salesforce Sans"/>
-            </a:endParaRPr>
-          </a:p>
-        </p:txBody>
-      </p:sp>
-      <p:sp>
-        <p:nvSpPr>
-          <p:cNvPr id="10" name="內容預留位置 9"/>
-          <p:cNvSpPr>
-            <a:spLocks noGrp="1"/>
-          </p:cNvSpPr>
-          <p:nvPr>
-            <p:ph sz="half" idx="2"/>
-          </p:nvPr>
-        </p:nvSpPr>
-        <p:spPr/>
-        <p:txBody>
-          <a:bodyPr rtlCol="0"/>
-          <a:lstStyle/>
-          <a:p>
-            <a:pPr rtl="0"/>
-            <a:endParaRPr lang="zh-TW" altLang="en-US" dirty="0">
-              <a:sym typeface="Salesforce Sans"/>
-            </a:endParaRPr>
-          </a:p>
-        </p:txBody>
-      </p:sp>
-      <p:sp>
-        <p:nvSpPr>
-          <p:cNvPr id="9" name="文字預留位置 8"/>
-          <p:cNvSpPr>
-            <a:spLocks noGrp="1"/>
-          </p:cNvSpPr>
-          <p:nvPr>
-            <p:ph type="body" sz="quarter" idx="3"/>
-          </p:nvPr>
-        </p:nvSpPr>
-        <p:spPr/>
-        <p:txBody>
-          <a:bodyPr rtlCol="0"/>
-          <a:lstStyle/>
-          <a:p>
-            <a:pPr rtl="0"/>
-            <a:endParaRPr lang="zh-TW" altLang="en-US" dirty="0">
-              <a:sym typeface="Salesforce Sans"/>
-            </a:endParaRPr>
-          </a:p>
-        </p:txBody>
-      </p:sp>
-      <p:sp>
-        <p:nvSpPr>
-          <p:cNvPr id="11" name="內容預留位置 10"/>
-          <p:cNvSpPr>
-            <a:spLocks noGrp="1"/>
-          </p:cNvSpPr>
-          <p:nvPr>
-            <p:ph sz="quarter" idx="4"/>
-          </p:nvPr>
-        </p:nvSpPr>
-        <p:spPr/>
-        <p:txBody>
-          <a:bodyPr rtlCol="0"/>
-          <a:lstStyle/>
-          <a:p>
-            <a:pPr rtl="0"/>
-            <a:endParaRPr lang="zh-TW" altLang="en-US" dirty="0">
-              <a:sym typeface="Salesforce Sans"/>
-            </a:endParaRPr>
-          </a:p>
-        </p:txBody>
-      </p:sp>
-    </p:spTree>
-    <p:extLst>
-      <p:ext uri="{BB962C8B-B14F-4D97-AF65-F5344CB8AC3E}">
-        <p14:creationId xmlns:p14="http://schemas.microsoft.com/office/powerpoint/2010/main" val="2672039197"/>
-      </p:ext>
-    </p:extLst>
-  </p:cSld>
-  <p:clrMapOvr>
-    <a:masterClrMapping/>
-  </p:clrMapOvr>
-  <mc:AlternateContent xmlns:mc="http://schemas.openxmlformats.org/markup-compatibility/2006" xmlns:p14="http://schemas.microsoft.com/office/powerpoint/2010/main">
-    <mc:Choice Requires="p14">
-      <p:transition spd="med" p14:dur="700">
-        <p:fade/>
-      </p:transition>
-    </mc:Choice>
-    <mc:Fallback xmlns="">
-      <p:transition spd="med">
-        <p:fade/>
-      </p:transition>
-    </mc:Fallback>
-  </mc:AlternateContent>
-</p:sld>
-</file>
-
 <file path=ppt/slides/slide8.xml><?xml version="1.0" encoding="utf-8"?>
 <p:sld xmlns:a="http://schemas.openxmlformats.org/drawingml/2006/main" xmlns:r="http://schemas.openxmlformats.org/officeDocument/2006/relationships" xmlns:p="http://schemas.openxmlformats.org/presentationml/2006/main">
   <p:cSld>
@@ -14636,7 +15437,7 @@
       </p:grpSpPr>
       <p:sp>
         <p:nvSpPr>
-          <p:cNvPr id="3" name="標題 2"/>
+          <p:cNvPr id="2" name="標題 1"/>
           <p:cNvSpPr>
             <a:spLocks noGrp="1"/>
           </p:cNvSpPr>
@@ -14654,13 +15455,19 @@
               <a:rPr lang="zh-TW" altLang="en-US" dirty="0" smtClean="0">
                 <a:sym typeface="Salesforce Sans"/>
               </a:rPr>
-              <a:t>新增投影片標題 </a:t>
+              <a:t>含 </a:t>
             </a:r>
             <a:r>
               <a:rPr lang="en-US" altLang="zh-TW" dirty="0" smtClean="0">
                 <a:sym typeface="Salesforce Sans"/>
               </a:rPr>
-              <a:t>- 3</a:t>
+              <a:t>SmartArt </a:t>
+            </a:r>
+            <a:r>
+              <a:rPr lang="zh-TW" altLang="en-US" dirty="0" smtClean="0">
+                <a:sym typeface="Salesforce Sans"/>
+              </a:rPr>
+              <a:t>的兩項內容版面配置</a:t>
             </a:r>
             <a:endParaRPr lang="zh-TW" altLang="en-US" dirty="0">
               <a:sym typeface="Salesforce Sans"/>
@@ -14668,10 +15475,81 @@
           </a:p>
         </p:txBody>
       </p:sp>
+      <p:sp>
+        <p:nvSpPr>
+          <p:cNvPr id="3" name="內容預留位置 2"/>
+          <p:cNvSpPr>
+            <a:spLocks noGrp="1"/>
+          </p:cNvSpPr>
+          <p:nvPr>
+            <p:ph sz="half" idx="1"/>
+          </p:nvPr>
+        </p:nvSpPr>
+        <p:spPr/>
+        <p:txBody>
+          <a:bodyPr rtlCol="0"/>
+          <a:lstStyle/>
+          <a:p>
+            <a:pPr rtl="0"/>
+            <a:r>
+              <a:rPr lang="zh-TW" altLang="en-US" dirty="0" smtClean="0">
+                <a:sym typeface="Salesforce Sans"/>
+              </a:rPr>
+              <a:t>第一個項目符號</a:t>
+            </a:r>
+          </a:p>
+          <a:p>
+            <a:pPr rtl="0"/>
+            <a:r>
+              <a:rPr lang="zh-TW" altLang="en-US" dirty="0" smtClean="0">
+                <a:sym typeface="Salesforce Sans"/>
+              </a:rPr>
+              <a:t>第二個項目符號</a:t>
+            </a:r>
+          </a:p>
+          <a:p>
+            <a:pPr rtl="0"/>
+            <a:r>
+              <a:rPr lang="zh-TW" altLang="en-US" dirty="0" smtClean="0">
+                <a:sym typeface="Salesforce Sans"/>
+              </a:rPr>
+              <a:t>第三個項目符號</a:t>
+            </a:r>
+            <a:endParaRPr lang="zh-TW" altLang="en-US" dirty="0">
+              <a:sym typeface="Salesforce Sans"/>
+            </a:endParaRPr>
+          </a:p>
+        </p:txBody>
+      </p:sp>
+      <p:graphicFrame>
+        <p:nvGraphicFramePr>
+          <p:cNvPr id="5" name="內容預留位置 4" descr="由上至下依序顯示 3 項工作的交錯流程圖，兩個向下箭號用來表示由第一項工作到第二項工作，再由第二項工作到第三項工作的進程。"/>
+          <p:cNvGraphicFramePr>
+            <a:graphicFrameLocks noGrp="1"/>
+          </p:cNvGraphicFramePr>
+          <p:nvPr>
+            <p:ph sz="half" idx="2"/>
+            <p:extLst>
+              <p:ext uri="{D42A27DB-BD31-4B8C-83A1-F6EECF244321}">
+                <p14:modId xmlns:p14="http://schemas.microsoft.com/office/powerpoint/2010/main" val="2150814564"/>
+              </p:ext>
+            </p:extLst>
+          </p:nvPr>
+        </p:nvGraphicFramePr>
+        <p:xfrm>
+          <a:off x="6200775" y="1731963"/>
+          <a:ext cx="5064125" cy="4059237"/>
+        </p:xfrm>
+        <a:graphic>
+          <a:graphicData uri="http://schemas.openxmlformats.org/drawingml/2006/diagram">
+            <dgm:relIds xmlns:dgm="http://schemas.openxmlformats.org/drawingml/2006/diagram" xmlns:r="http://schemas.openxmlformats.org/officeDocument/2006/relationships" r:dm="rId3" r:lo="rId4" r:qs="rId5" r:cs="rId6"/>
+          </a:graphicData>
+        </a:graphic>
+      </p:graphicFrame>
     </p:spTree>
     <p:extLst>
       <p:ext uri="{BB962C8B-B14F-4D97-AF65-F5344CB8AC3E}">
-        <p14:creationId xmlns:p14="http://schemas.microsoft.com/office/powerpoint/2010/main" val="397710800"/>
+        <p14:creationId xmlns:p14="http://schemas.microsoft.com/office/powerpoint/2010/main" val="4123189245"/>
       </p:ext>
     </p:extLst>
   </p:cSld>
@@ -14710,10 +15588,66 @@
           <a:chExt cx="0" cy="0"/>
         </a:xfrm>
       </p:grpSpPr>
+      <p:sp>
+        <p:nvSpPr>
+          <p:cNvPr id="4" name="標題 3"/>
+          <p:cNvSpPr>
+            <a:spLocks noGrp="1"/>
+          </p:cNvSpPr>
+          <p:nvPr>
+            <p:ph type="title"/>
+          </p:nvPr>
+        </p:nvSpPr>
+        <p:spPr/>
+        <p:txBody>
+          <a:bodyPr rtlCol="0"/>
+          <a:lstStyle/>
+          <a:p>
+            <a:pPr rtl="0"/>
+            <a:r>
+              <a:rPr lang="zh-TW" altLang="en-US" dirty="0" smtClean="0">
+                <a:sym typeface="Salesforce Sans"/>
+              </a:rPr>
+              <a:t>新增投影片標題 </a:t>
+            </a:r>
+            <a:r>
+              <a:rPr lang="en-US" altLang="zh-TW" dirty="0" smtClean="0">
+                <a:sym typeface="Salesforce Sans"/>
+              </a:rPr>
+              <a:t>- 1</a:t>
+            </a:r>
+            <a:endParaRPr lang="zh-TW" altLang="en-US" dirty="0">
+              <a:sym typeface="Salesforce Sans"/>
+            </a:endParaRPr>
+          </a:p>
+        </p:txBody>
+      </p:sp>
+      <p:sp>
+        <p:nvSpPr>
+          <p:cNvPr id="5" name="文字預留位置 4"/>
+          <p:cNvSpPr>
+            <a:spLocks noGrp="1"/>
+          </p:cNvSpPr>
+          <p:nvPr>
+            <p:ph type="body" idx="1"/>
+          </p:nvPr>
+        </p:nvSpPr>
+        <p:spPr/>
+        <p:txBody>
+          <a:bodyPr rtlCol="0"/>
+          <a:lstStyle/>
+          <a:p>
+            <a:pPr rtl="0"/>
+            <a:endParaRPr lang="zh-TW" altLang="en-US" dirty="0">
+              <a:sym typeface="Salesforce Sans"/>
+            </a:endParaRPr>
+          </a:p>
+        </p:txBody>
+      </p:sp>
     </p:spTree>
     <p:extLst>
       <p:ext uri="{BB962C8B-B14F-4D97-AF65-F5344CB8AC3E}">
-        <p14:creationId xmlns:p14="http://schemas.microsoft.com/office/powerpoint/2010/main" val="1405850135"/>
+        <p14:creationId xmlns:p14="http://schemas.microsoft.com/office/powerpoint/2010/main" val="4264977537"/>
       </p:ext>
     </p:extLst>
   </p:cSld>
@@ -15577,6 +16511,142 @@
 </file>
 
 <file path=customXml/item2.xml><?xml version="1.0" encoding="utf-8"?>
+<p:properties xmlns:p="http://schemas.microsoft.com/office/2006/metadata/properties" xmlns:xsi="http://www.w3.org/2001/XMLSchema-instance" xmlns:pc="http://schemas.microsoft.com/office/infopath/2007/PartnerControls">
+  <documentManagement>
+    <LocPublishedLinkedAssetsLookup xmlns="4873beb7-5857-4685-be1f-d57550cc96cc" xsi:nil="true"/>
+    <ApprovalStatus xmlns="4873beb7-5857-4685-be1f-d57550cc96cc">InProgress</ApprovalStatus>
+    <MarketSpecific xmlns="4873beb7-5857-4685-be1f-d57550cc96cc">false</MarketSpecific>
+    <LocComments xmlns="4873beb7-5857-4685-be1f-d57550cc96cc" xsi:nil="true"/>
+    <LocLastLocAttemptVersionTypeLookup xmlns="4873beb7-5857-4685-be1f-d57550cc96cc" xsi:nil="true"/>
+    <DirectSourceMarket xmlns="4873beb7-5857-4685-be1f-d57550cc96cc" xsi:nil="true"/>
+    <ThumbnailAssetId xmlns="4873beb7-5857-4685-be1f-d57550cc96cc" xsi:nil="true"/>
+    <PrimaryImageGen xmlns="4873beb7-5857-4685-be1f-d57550cc96cc">false</PrimaryImageGen>
+    <LocNewPublishedVersionLookup xmlns="4873beb7-5857-4685-be1f-d57550cc96cc" xsi:nil="true"/>
+    <LegacyData xmlns="4873beb7-5857-4685-be1f-d57550cc96cc" xsi:nil="true"/>
+    <LocRecommendedHandoff xmlns="4873beb7-5857-4685-be1f-d57550cc96cc" xsi:nil="true"/>
+    <BusinessGroup xmlns="4873beb7-5857-4685-be1f-d57550cc96cc" xsi:nil="true"/>
+    <BlockPublish xmlns="4873beb7-5857-4685-be1f-d57550cc96cc">false</BlockPublish>
+    <TPFriendlyName xmlns="4873beb7-5857-4685-be1f-d57550cc96cc" xsi:nil="true"/>
+    <LocOverallPublishStatusLookup xmlns="4873beb7-5857-4685-be1f-d57550cc96cc" xsi:nil="true"/>
+    <NumericId xmlns="4873beb7-5857-4685-be1f-d57550cc96cc" xsi:nil="true"/>
+    <APEditor xmlns="4873beb7-5857-4685-be1f-d57550cc96cc">
+      <UserInfo>
+        <DisplayName/>
+        <AccountId xsi:nil="true"/>
+        <AccountType/>
+      </UserInfo>
+    </APEditor>
+    <SourceTitle xmlns="4873beb7-5857-4685-be1f-d57550cc96cc" xsi:nil="true"/>
+    <OpenTemplate xmlns="4873beb7-5857-4685-be1f-d57550cc96cc">true</OpenTemplate>
+    <LocOverallLocStatusLookup xmlns="4873beb7-5857-4685-be1f-d57550cc96cc" xsi:nil="true"/>
+    <UALocComments xmlns="4873beb7-5857-4685-be1f-d57550cc96cc" xsi:nil="true"/>
+    <ParentAssetId xmlns="4873beb7-5857-4685-be1f-d57550cc96cc" xsi:nil="true"/>
+    <IntlLangReviewDate xmlns="4873beb7-5857-4685-be1f-d57550cc96cc" xsi:nil="true"/>
+    <FeatureTagsTaxHTField0 xmlns="4873beb7-5857-4685-be1f-d57550cc96cc">
+      <Terms xmlns="http://schemas.microsoft.com/office/infopath/2007/PartnerControls"/>
+    </FeatureTagsTaxHTField0>
+    <PublishStatusLookup xmlns="4873beb7-5857-4685-be1f-d57550cc96cc">
+      <Value>1345093</Value>
+    </PublishStatusLookup>
+    <Providers xmlns="4873beb7-5857-4685-be1f-d57550cc96cc" xsi:nil="true"/>
+    <MachineTranslated xmlns="4873beb7-5857-4685-be1f-d57550cc96cc">false</MachineTranslated>
+    <OriginalSourceMarket xmlns="4873beb7-5857-4685-be1f-d57550cc96cc" xsi:nil="true"/>
+    <APDescription xmlns="4873beb7-5857-4685-be1f-d57550cc96cc">This simple template design works for technology and  businesses, but it's versatile enough to use in other contexts.  It features multiple slide layouts designed for widescreen (16x9 resolution) and includes a sample SmartArt list and chart that are easily editable.</APDescription>
+    <ClipArtFilename xmlns="4873beb7-5857-4685-be1f-d57550cc96cc" xsi:nil="true"/>
+    <ContentItem xmlns="4873beb7-5857-4685-be1f-d57550cc96cc" xsi:nil="true"/>
+    <TPInstallLocation xmlns="4873beb7-5857-4685-be1f-d57550cc96cc" xsi:nil="true"/>
+    <PublishTargets xmlns="4873beb7-5857-4685-be1f-d57550cc96cc">OfficeOnlineVNext</PublishTargets>
+    <TimesCloned xmlns="4873beb7-5857-4685-be1f-d57550cc96cc" xsi:nil="true"/>
+    <AssetStart xmlns="4873beb7-5857-4685-be1f-d57550cc96cc">2011-11-26T00:30:00+00:00</AssetStart>
+    <Provider xmlns="4873beb7-5857-4685-be1f-d57550cc96cc" xsi:nil="true"/>
+    <AcquiredFrom xmlns="4873beb7-5857-4685-be1f-d57550cc96cc">Internal MS</AcquiredFrom>
+    <FriendlyTitle xmlns="4873beb7-5857-4685-be1f-d57550cc96cc" xsi:nil="true"/>
+    <LastHandOff xmlns="4873beb7-5857-4685-be1f-d57550cc96cc" xsi:nil="true"/>
+    <TPClientViewer xmlns="4873beb7-5857-4685-be1f-d57550cc96cc" xsi:nil="true"/>
+    <TemplateStatus xmlns="4873beb7-5857-4685-be1f-d57550cc96cc">Complete</TemplateStatus>
+    <Downloads xmlns="4873beb7-5857-4685-be1f-d57550cc96cc">0</Downloads>
+    <OOCacheId xmlns="4873beb7-5857-4685-be1f-d57550cc96cc" xsi:nil="true"/>
+    <IsDeleted xmlns="4873beb7-5857-4685-be1f-d57550cc96cc">false</IsDeleted>
+    <LocPublishedDependentAssetsLookup xmlns="4873beb7-5857-4685-be1f-d57550cc96cc" xsi:nil="true"/>
+    <TPExecutable xmlns="4873beb7-5857-4685-be1f-d57550cc96cc" xsi:nil="true"/>
+    <EditorialTags xmlns="4873beb7-5857-4685-be1f-d57550cc96cc" xsi:nil="true"/>
+    <SubmitterId xmlns="4873beb7-5857-4685-be1f-d57550cc96cc" xsi:nil="true"/>
+    <ApprovalLog xmlns="4873beb7-5857-4685-be1f-d57550cc96cc" xsi:nil="true"/>
+    <AssetType xmlns="4873beb7-5857-4685-be1f-d57550cc96cc">TP</AssetType>
+    <BugNumber xmlns="4873beb7-5857-4685-be1f-d57550cc96cc" xsi:nil="true"/>
+    <CSXSubmissionDate xmlns="4873beb7-5857-4685-be1f-d57550cc96cc" xsi:nil="true"/>
+    <CSXUpdate xmlns="4873beb7-5857-4685-be1f-d57550cc96cc">false</CSXUpdate>
+    <Milestone xmlns="4873beb7-5857-4685-be1f-d57550cc96cc" xsi:nil="true"/>
+    <RecommendationsModifier xmlns="4873beb7-5857-4685-be1f-d57550cc96cc" xsi:nil="true"/>
+    <OriginAsset xmlns="4873beb7-5857-4685-be1f-d57550cc96cc" xsi:nil="true"/>
+    <TPComponent xmlns="4873beb7-5857-4685-be1f-d57550cc96cc" xsi:nil="true"/>
+    <AssetId xmlns="4873beb7-5857-4685-be1f-d57550cc96cc">TP102787989</AssetId>
+    <IntlLocPriority xmlns="4873beb7-5857-4685-be1f-d57550cc96cc" xsi:nil="true"/>
+    <PolicheckWords xmlns="4873beb7-5857-4685-be1f-d57550cc96cc" xsi:nil="true"/>
+    <TPLaunchHelpLink xmlns="4873beb7-5857-4685-be1f-d57550cc96cc" xsi:nil="true"/>
+    <TPApplication xmlns="4873beb7-5857-4685-be1f-d57550cc96cc" xsi:nil="true"/>
+    <CrawlForDependencies xmlns="4873beb7-5857-4685-be1f-d57550cc96cc">false</CrawlForDependencies>
+    <HandoffToMSDN xmlns="4873beb7-5857-4685-be1f-d57550cc96cc" xsi:nil="true"/>
+    <PlannedPubDate xmlns="4873beb7-5857-4685-be1f-d57550cc96cc" xsi:nil="true"/>
+    <IntlLangReviewer xmlns="4873beb7-5857-4685-be1f-d57550cc96cc" xsi:nil="true"/>
+    <TrustLevel xmlns="4873beb7-5857-4685-be1f-d57550cc96cc">1 Microsoft Managed Content</TrustLevel>
+    <LocLastLocAttemptVersionLookup xmlns="4873beb7-5857-4685-be1f-d57550cc96cc">694266</LocLastLocAttemptVersionLookup>
+    <LocProcessedForHandoffsLookup xmlns="4873beb7-5857-4685-be1f-d57550cc96cc" xsi:nil="true"/>
+    <IsSearchable xmlns="4873beb7-5857-4685-be1f-d57550cc96cc">true</IsSearchable>
+    <TemplateTemplateType xmlns="4873beb7-5857-4685-be1f-d57550cc96cc">PowerPoint Presentation Template</TemplateTemplateType>
+    <CampaignTagsTaxHTField0 xmlns="4873beb7-5857-4685-be1f-d57550cc96cc">
+      <Terms xmlns="http://schemas.microsoft.com/office/infopath/2007/PartnerControls"/>
+    </CampaignTagsTaxHTField0>
+    <TPNamespace xmlns="4873beb7-5857-4685-be1f-d57550cc96cc" xsi:nil="true"/>
+    <LocOverallPreviewStatusLookup xmlns="4873beb7-5857-4685-be1f-d57550cc96cc" xsi:nil="true"/>
+    <TaxCatchAll xmlns="4873beb7-5857-4685-be1f-d57550cc96cc"/>
+    <Markets xmlns="4873beb7-5857-4685-be1f-d57550cc96cc"/>
+    <UAProjectedTotalWords xmlns="4873beb7-5857-4685-be1f-d57550cc96cc" xsi:nil="true"/>
+    <IntlLangReview xmlns="4873beb7-5857-4685-be1f-d57550cc96cc" xsi:nil="true"/>
+    <OutputCachingOn xmlns="4873beb7-5857-4685-be1f-d57550cc96cc">false</OutputCachingOn>
+    <AverageRating xmlns="4873beb7-5857-4685-be1f-d57550cc96cc" xsi:nil="true"/>
+    <APAuthor xmlns="4873beb7-5857-4685-be1f-d57550cc96cc">
+      <UserInfo>
+        <DisplayName>REDMOND\kristaa</DisplayName>
+        <AccountId>136</AccountId>
+        <AccountType/>
+      </UserInfo>
+    </APAuthor>
+    <LocManualTestRequired xmlns="4873beb7-5857-4685-be1f-d57550cc96cc">false</LocManualTestRequired>
+    <TPCommandLine xmlns="4873beb7-5857-4685-be1f-d57550cc96cc" xsi:nil="true"/>
+    <TPAppVersion xmlns="4873beb7-5857-4685-be1f-d57550cc96cc" xsi:nil="true"/>
+    <EditorialStatus xmlns="4873beb7-5857-4685-be1f-d57550cc96cc">Complete</EditorialStatus>
+    <LastModifiedDateTime xmlns="4873beb7-5857-4685-be1f-d57550cc96cc" xsi:nil="true"/>
+    <ScenarioTagsTaxHTField0 xmlns="4873beb7-5857-4685-be1f-d57550cc96cc">
+      <Terms xmlns="http://schemas.microsoft.com/office/infopath/2007/PartnerControls"/>
+    </ScenarioTagsTaxHTField0>
+    <LocProcessedForMarketsLookup xmlns="4873beb7-5857-4685-be1f-d57550cc96cc" xsi:nil="true"/>
+    <TPLaunchHelpLinkType xmlns="4873beb7-5857-4685-be1f-d57550cc96cc">Template</TPLaunchHelpLinkType>
+    <OriginalRelease xmlns="4873beb7-5857-4685-be1f-d57550cc96cc">15</OriginalRelease>
+    <LocalizationTagsTaxHTField0 xmlns="4873beb7-5857-4685-be1f-d57550cc96cc">
+      <Terms xmlns="http://schemas.microsoft.com/office/infopath/2007/PartnerControls"/>
+    </LocalizationTagsTaxHTField0>
+    <UACurrentWords xmlns="4873beb7-5857-4685-be1f-d57550cc96cc" xsi:nil="true"/>
+    <ArtSampleDocs xmlns="4873beb7-5857-4685-be1f-d57550cc96cc" xsi:nil="true"/>
+    <UALocRecommendation xmlns="4873beb7-5857-4685-be1f-d57550cc96cc">Localize</UALocRecommendation>
+    <Manager xmlns="4873beb7-5857-4685-be1f-d57550cc96cc" xsi:nil="true"/>
+    <LocOverallHandbackStatusLookup xmlns="4873beb7-5857-4685-be1f-d57550cc96cc" xsi:nil="true"/>
+    <ShowIn xmlns="4873beb7-5857-4685-be1f-d57550cc96cc">Show everywhere</ShowIn>
+    <UANotes xmlns="4873beb7-5857-4685-be1f-d57550cc96cc" xsi:nil="true"/>
+    <InternalTagsTaxHTField0 xmlns="4873beb7-5857-4685-be1f-d57550cc96cc">
+      <Terms xmlns="http://schemas.microsoft.com/office/infopath/2007/PartnerControls"/>
+    </InternalTagsTaxHTField0>
+    <CSXHash xmlns="4873beb7-5857-4685-be1f-d57550cc96cc" xsi:nil="true"/>
+    <VoteCount xmlns="4873beb7-5857-4685-be1f-d57550cc96cc" xsi:nil="true"/>
+    <AssetExpire xmlns="4873beb7-5857-4685-be1f-d57550cc96cc">2029-05-12T07:00:00+00:00</AssetExpire>
+    <DSATActionTaken xmlns="4873beb7-5857-4685-be1f-d57550cc96cc" xsi:nil="true"/>
+    <CSXSubmissionMarket xmlns="4873beb7-5857-4685-be1f-d57550cc96cc" xsi:nil="true"/>
+    <LocMarketGroupTiers2 xmlns="4873beb7-5857-4685-be1f-d57550cc96cc" xsi:nil="true"/>
+  </documentManagement>
+</p:properties>
+</file>
+
+<file path=customXml/item3.xml><?xml version="1.0" encoding="utf-8"?>
 <ct:contentTypeSchema xmlns:ct="http://schemas.microsoft.com/office/2006/metadata/contentType" xmlns:ma="http://schemas.microsoft.com/office/2006/metadata/properties/metaAttributes" ct:_="" ma:_="" ma:contentTypeName="TemplateFile" ma:contentTypeID="0x0101006EDDDB5EE6D98C44930B742096920B300400F5B6D36B3EF94B4E9A635CDF2A18F5B8" ma:contentTypeVersion="72" ma:contentTypeDescription="Create a new document." ma:contentTypeScope="" ma:versionID="a23e56308344d904b51738559c3d67c9">
   <xsd:schema xmlns:xsd="http://www.w3.org/2001/XMLSchema" xmlns:xs="http://www.w3.org/2001/XMLSchema" xmlns:p="http://schemas.microsoft.com/office/2006/metadata/properties" xmlns:ns2="4873beb7-5857-4685-be1f-d57550cc96cc" targetNamespace="http://schemas.microsoft.com/office/2006/metadata/properties" ma:root="true" ma:fieldsID="cd0908cc4600e77bf5da051303e00c8d" ns2:_="">
     <xsd:import namespace="4873beb7-5857-4685-be1f-d57550cc96cc"/>
@@ -16616,142 +17686,6 @@
 </ct:contentTypeSchema>
 </file>
 
-<file path=customXml/item3.xml><?xml version="1.0" encoding="utf-8"?>
-<p:properties xmlns:p="http://schemas.microsoft.com/office/2006/metadata/properties" xmlns:xsi="http://www.w3.org/2001/XMLSchema-instance" xmlns:pc="http://schemas.microsoft.com/office/infopath/2007/PartnerControls">
-  <documentManagement>
-    <LocPublishedLinkedAssetsLookup xmlns="4873beb7-5857-4685-be1f-d57550cc96cc" xsi:nil="true"/>
-    <ApprovalStatus xmlns="4873beb7-5857-4685-be1f-d57550cc96cc">InProgress</ApprovalStatus>
-    <MarketSpecific xmlns="4873beb7-5857-4685-be1f-d57550cc96cc">false</MarketSpecific>
-    <LocComments xmlns="4873beb7-5857-4685-be1f-d57550cc96cc" xsi:nil="true"/>
-    <LocLastLocAttemptVersionTypeLookup xmlns="4873beb7-5857-4685-be1f-d57550cc96cc" xsi:nil="true"/>
-    <DirectSourceMarket xmlns="4873beb7-5857-4685-be1f-d57550cc96cc" xsi:nil="true"/>
-    <ThumbnailAssetId xmlns="4873beb7-5857-4685-be1f-d57550cc96cc" xsi:nil="true"/>
-    <PrimaryImageGen xmlns="4873beb7-5857-4685-be1f-d57550cc96cc">false</PrimaryImageGen>
-    <LocNewPublishedVersionLookup xmlns="4873beb7-5857-4685-be1f-d57550cc96cc" xsi:nil="true"/>
-    <LegacyData xmlns="4873beb7-5857-4685-be1f-d57550cc96cc" xsi:nil="true"/>
-    <LocRecommendedHandoff xmlns="4873beb7-5857-4685-be1f-d57550cc96cc" xsi:nil="true"/>
-    <BusinessGroup xmlns="4873beb7-5857-4685-be1f-d57550cc96cc" xsi:nil="true"/>
-    <BlockPublish xmlns="4873beb7-5857-4685-be1f-d57550cc96cc">false</BlockPublish>
-    <TPFriendlyName xmlns="4873beb7-5857-4685-be1f-d57550cc96cc" xsi:nil="true"/>
-    <LocOverallPublishStatusLookup xmlns="4873beb7-5857-4685-be1f-d57550cc96cc" xsi:nil="true"/>
-    <NumericId xmlns="4873beb7-5857-4685-be1f-d57550cc96cc" xsi:nil="true"/>
-    <APEditor xmlns="4873beb7-5857-4685-be1f-d57550cc96cc">
-      <UserInfo>
-        <DisplayName/>
-        <AccountId xsi:nil="true"/>
-        <AccountType/>
-      </UserInfo>
-    </APEditor>
-    <SourceTitle xmlns="4873beb7-5857-4685-be1f-d57550cc96cc" xsi:nil="true"/>
-    <OpenTemplate xmlns="4873beb7-5857-4685-be1f-d57550cc96cc">true</OpenTemplate>
-    <LocOverallLocStatusLookup xmlns="4873beb7-5857-4685-be1f-d57550cc96cc" xsi:nil="true"/>
-    <UALocComments xmlns="4873beb7-5857-4685-be1f-d57550cc96cc" xsi:nil="true"/>
-    <ParentAssetId xmlns="4873beb7-5857-4685-be1f-d57550cc96cc" xsi:nil="true"/>
-    <IntlLangReviewDate xmlns="4873beb7-5857-4685-be1f-d57550cc96cc" xsi:nil="true"/>
-    <FeatureTagsTaxHTField0 xmlns="4873beb7-5857-4685-be1f-d57550cc96cc">
-      <Terms xmlns="http://schemas.microsoft.com/office/infopath/2007/PartnerControls"/>
-    </FeatureTagsTaxHTField0>
-    <PublishStatusLookup xmlns="4873beb7-5857-4685-be1f-d57550cc96cc">
-      <Value>1345093</Value>
-    </PublishStatusLookup>
-    <Providers xmlns="4873beb7-5857-4685-be1f-d57550cc96cc" xsi:nil="true"/>
-    <MachineTranslated xmlns="4873beb7-5857-4685-be1f-d57550cc96cc">false</MachineTranslated>
-    <OriginalSourceMarket xmlns="4873beb7-5857-4685-be1f-d57550cc96cc" xsi:nil="true"/>
-    <APDescription xmlns="4873beb7-5857-4685-be1f-d57550cc96cc">This simple template design works for technology and  businesses, but it's versatile enough to use in other contexts.  It features multiple slide layouts designed for widescreen (16x9 resolution) and includes a sample SmartArt list and chart that are easily editable.</APDescription>
-    <ClipArtFilename xmlns="4873beb7-5857-4685-be1f-d57550cc96cc" xsi:nil="true"/>
-    <ContentItem xmlns="4873beb7-5857-4685-be1f-d57550cc96cc" xsi:nil="true"/>
-    <TPInstallLocation xmlns="4873beb7-5857-4685-be1f-d57550cc96cc" xsi:nil="true"/>
-    <PublishTargets xmlns="4873beb7-5857-4685-be1f-d57550cc96cc">OfficeOnlineVNext</PublishTargets>
-    <TimesCloned xmlns="4873beb7-5857-4685-be1f-d57550cc96cc" xsi:nil="true"/>
-    <AssetStart xmlns="4873beb7-5857-4685-be1f-d57550cc96cc">2011-11-26T00:30:00+00:00</AssetStart>
-    <Provider xmlns="4873beb7-5857-4685-be1f-d57550cc96cc" xsi:nil="true"/>
-    <AcquiredFrom xmlns="4873beb7-5857-4685-be1f-d57550cc96cc">Internal MS</AcquiredFrom>
-    <FriendlyTitle xmlns="4873beb7-5857-4685-be1f-d57550cc96cc" xsi:nil="true"/>
-    <LastHandOff xmlns="4873beb7-5857-4685-be1f-d57550cc96cc" xsi:nil="true"/>
-    <TPClientViewer xmlns="4873beb7-5857-4685-be1f-d57550cc96cc" xsi:nil="true"/>
-    <TemplateStatus xmlns="4873beb7-5857-4685-be1f-d57550cc96cc">Complete</TemplateStatus>
-    <Downloads xmlns="4873beb7-5857-4685-be1f-d57550cc96cc">0</Downloads>
-    <OOCacheId xmlns="4873beb7-5857-4685-be1f-d57550cc96cc" xsi:nil="true"/>
-    <IsDeleted xmlns="4873beb7-5857-4685-be1f-d57550cc96cc">false</IsDeleted>
-    <LocPublishedDependentAssetsLookup xmlns="4873beb7-5857-4685-be1f-d57550cc96cc" xsi:nil="true"/>
-    <TPExecutable xmlns="4873beb7-5857-4685-be1f-d57550cc96cc" xsi:nil="true"/>
-    <EditorialTags xmlns="4873beb7-5857-4685-be1f-d57550cc96cc" xsi:nil="true"/>
-    <SubmitterId xmlns="4873beb7-5857-4685-be1f-d57550cc96cc" xsi:nil="true"/>
-    <ApprovalLog xmlns="4873beb7-5857-4685-be1f-d57550cc96cc" xsi:nil="true"/>
-    <AssetType xmlns="4873beb7-5857-4685-be1f-d57550cc96cc">TP</AssetType>
-    <BugNumber xmlns="4873beb7-5857-4685-be1f-d57550cc96cc" xsi:nil="true"/>
-    <CSXSubmissionDate xmlns="4873beb7-5857-4685-be1f-d57550cc96cc" xsi:nil="true"/>
-    <CSXUpdate xmlns="4873beb7-5857-4685-be1f-d57550cc96cc">false</CSXUpdate>
-    <Milestone xmlns="4873beb7-5857-4685-be1f-d57550cc96cc" xsi:nil="true"/>
-    <RecommendationsModifier xmlns="4873beb7-5857-4685-be1f-d57550cc96cc" xsi:nil="true"/>
-    <OriginAsset xmlns="4873beb7-5857-4685-be1f-d57550cc96cc" xsi:nil="true"/>
-    <TPComponent xmlns="4873beb7-5857-4685-be1f-d57550cc96cc" xsi:nil="true"/>
-    <AssetId xmlns="4873beb7-5857-4685-be1f-d57550cc96cc">TP102787989</AssetId>
-    <IntlLocPriority xmlns="4873beb7-5857-4685-be1f-d57550cc96cc" xsi:nil="true"/>
-    <PolicheckWords xmlns="4873beb7-5857-4685-be1f-d57550cc96cc" xsi:nil="true"/>
-    <TPLaunchHelpLink xmlns="4873beb7-5857-4685-be1f-d57550cc96cc" xsi:nil="true"/>
-    <TPApplication xmlns="4873beb7-5857-4685-be1f-d57550cc96cc" xsi:nil="true"/>
-    <CrawlForDependencies xmlns="4873beb7-5857-4685-be1f-d57550cc96cc">false</CrawlForDependencies>
-    <HandoffToMSDN xmlns="4873beb7-5857-4685-be1f-d57550cc96cc" xsi:nil="true"/>
-    <PlannedPubDate xmlns="4873beb7-5857-4685-be1f-d57550cc96cc" xsi:nil="true"/>
-    <IntlLangReviewer xmlns="4873beb7-5857-4685-be1f-d57550cc96cc" xsi:nil="true"/>
-    <TrustLevel xmlns="4873beb7-5857-4685-be1f-d57550cc96cc">1 Microsoft Managed Content</TrustLevel>
-    <LocLastLocAttemptVersionLookup xmlns="4873beb7-5857-4685-be1f-d57550cc96cc">694266</LocLastLocAttemptVersionLookup>
-    <LocProcessedForHandoffsLookup xmlns="4873beb7-5857-4685-be1f-d57550cc96cc" xsi:nil="true"/>
-    <IsSearchable xmlns="4873beb7-5857-4685-be1f-d57550cc96cc">true</IsSearchable>
-    <TemplateTemplateType xmlns="4873beb7-5857-4685-be1f-d57550cc96cc">PowerPoint Presentation Template</TemplateTemplateType>
-    <CampaignTagsTaxHTField0 xmlns="4873beb7-5857-4685-be1f-d57550cc96cc">
-      <Terms xmlns="http://schemas.microsoft.com/office/infopath/2007/PartnerControls"/>
-    </CampaignTagsTaxHTField0>
-    <TPNamespace xmlns="4873beb7-5857-4685-be1f-d57550cc96cc" xsi:nil="true"/>
-    <LocOverallPreviewStatusLookup xmlns="4873beb7-5857-4685-be1f-d57550cc96cc" xsi:nil="true"/>
-    <TaxCatchAll xmlns="4873beb7-5857-4685-be1f-d57550cc96cc"/>
-    <Markets xmlns="4873beb7-5857-4685-be1f-d57550cc96cc"/>
-    <UAProjectedTotalWords xmlns="4873beb7-5857-4685-be1f-d57550cc96cc" xsi:nil="true"/>
-    <IntlLangReview xmlns="4873beb7-5857-4685-be1f-d57550cc96cc" xsi:nil="true"/>
-    <OutputCachingOn xmlns="4873beb7-5857-4685-be1f-d57550cc96cc">false</OutputCachingOn>
-    <AverageRating xmlns="4873beb7-5857-4685-be1f-d57550cc96cc" xsi:nil="true"/>
-    <APAuthor xmlns="4873beb7-5857-4685-be1f-d57550cc96cc">
-      <UserInfo>
-        <DisplayName>REDMOND\kristaa</DisplayName>
-        <AccountId>136</AccountId>
-        <AccountType/>
-      </UserInfo>
-    </APAuthor>
-    <LocManualTestRequired xmlns="4873beb7-5857-4685-be1f-d57550cc96cc">false</LocManualTestRequired>
-    <TPCommandLine xmlns="4873beb7-5857-4685-be1f-d57550cc96cc" xsi:nil="true"/>
-    <TPAppVersion xmlns="4873beb7-5857-4685-be1f-d57550cc96cc" xsi:nil="true"/>
-    <EditorialStatus xmlns="4873beb7-5857-4685-be1f-d57550cc96cc">Complete</EditorialStatus>
-    <LastModifiedDateTime xmlns="4873beb7-5857-4685-be1f-d57550cc96cc" xsi:nil="true"/>
-    <ScenarioTagsTaxHTField0 xmlns="4873beb7-5857-4685-be1f-d57550cc96cc">
-      <Terms xmlns="http://schemas.microsoft.com/office/infopath/2007/PartnerControls"/>
-    </ScenarioTagsTaxHTField0>
-    <LocProcessedForMarketsLookup xmlns="4873beb7-5857-4685-be1f-d57550cc96cc" xsi:nil="true"/>
-    <TPLaunchHelpLinkType xmlns="4873beb7-5857-4685-be1f-d57550cc96cc">Template</TPLaunchHelpLinkType>
-    <OriginalRelease xmlns="4873beb7-5857-4685-be1f-d57550cc96cc">15</OriginalRelease>
-    <LocalizationTagsTaxHTField0 xmlns="4873beb7-5857-4685-be1f-d57550cc96cc">
-      <Terms xmlns="http://schemas.microsoft.com/office/infopath/2007/PartnerControls"/>
-    </LocalizationTagsTaxHTField0>
-    <UACurrentWords xmlns="4873beb7-5857-4685-be1f-d57550cc96cc" xsi:nil="true"/>
-    <ArtSampleDocs xmlns="4873beb7-5857-4685-be1f-d57550cc96cc" xsi:nil="true"/>
-    <UALocRecommendation xmlns="4873beb7-5857-4685-be1f-d57550cc96cc">Localize</UALocRecommendation>
-    <Manager xmlns="4873beb7-5857-4685-be1f-d57550cc96cc" xsi:nil="true"/>
-    <LocOverallHandbackStatusLookup xmlns="4873beb7-5857-4685-be1f-d57550cc96cc" xsi:nil="true"/>
-    <ShowIn xmlns="4873beb7-5857-4685-be1f-d57550cc96cc">Show everywhere</ShowIn>
-    <UANotes xmlns="4873beb7-5857-4685-be1f-d57550cc96cc" xsi:nil="true"/>
-    <InternalTagsTaxHTField0 xmlns="4873beb7-5857-4685-be1f-d57550cc96cc">
-      <Terms xmlns="http://schemas.microsoft.com/office/infopath/2007/PartnerControls"/>
-    </InternalTagsTaxHTField0>
-    <CSXHash xmlns="4873beb7-5857-4685-be1f-d57550cc96cc" xsi:nil="true"/>
-    <VoteCount xmlns="4873beb7-5857-4685-be1f-d57550cc96cc" xsi:nil="true"/>
-    <AssetExpire xmlns="4873beb7-5857-4685-be1f-d57550cc96cc">2029-05-12T07:00:00+00:00</AssetExpire>
-    <DSATActionTaken xmlns="4873beb7-5857-4685-be1f-d57550cc96cc" xsi:nil="true"/>
-    <CSXSubmissionMarket xmlns="4873beb7-5857-4685-be1f-d57550cc96cc" xsi:nil="true"/>
-    <LocMarketGroupTiers2 xmlns="4873beb7-5857-4685-be1f-d57550cc96cc" xsi:nil="true"/>
-  </documentManagement>
-</p:properties>
-</file>
-
 <file path=customXml/itemProps1.xml><?xml version="1.0" encoding="utf-8"?>
 <ds:datastoreItem xmlns:ds="http://schemas.openxmlformats.org/officeDocument/2006/customXml" ds:itemID="{3836F65B-1B07-41EE-A0E8-BC6EF3855225}">
   <ds:schemaRefs>
@@ -16761,6 +17695,22 @@
 </file>
 
 <file path=customXml/itemProps2.xml><?xml version="1.0" encoding="utf-8"?>
+<ds:datastoreItem xmlns:ds="http://schemas.openxmlformats.org/officeDocument/2006/customXml" ds:itemID="{60C67BEE-D13F-4BD2-98A5-34D8A0977F68}">
+  <ds:schemaRefs>
+    <ds:schemaRef ds:uri="4873beb7-5857-4685-be1f-d57550cc96cc"/>
+    <ds:schemaRef ds:uri="http://schemas.openxmlformats.org/package/2006/metadata/core-properties"/>
+    <ds:schemaRef ds:uri="http://purl.org/dc/terms/"/>
+    <ds:schemaRef ds:uri="http://schemas.microsoft.com/office/2006/documentManagement/types"/>
+    <ds:schemaRef ds:uri="http://purl.org/dc/elements/1.1/"/>
+    <ds:schemaRef ds:uri="http://schemas.microsoft.com/office/2006/metadata/properties"/>
+    <ds:schemaRef ds:uri="http://schemas.microsoft.com/office/infopath/2007/PartnerControls"/>
+    <ds:schemaRef ds:uri="http://www.w3.org/XML/1998/namespace"/>
+    <ds:schemaRef ds:uri="http://purl.org/dc/dcmitype/"/>
+  </ds:schemaRefs>
+</ds:datastoreItem>
+</file>
+
+<file path=customXml/itemProps3.xml><?xml version="1.0" encoding="utf-8"?>
 <ds:datastoreItem xmlns:ds="http://schemas.openxmlformats.org/officeDocument/2006/customXml" ds:itemID="{A09BF4D4-EF60-4196-BFC3-9462D607978C}">
   <ds:schemaRefs>
     <ds:schemaRef ds:uri="http://schemas.microsoft.com/office/2006/metadata/contentType"/>
@@ -16776,20 +17726,4 @@
     <ds:schemaRef ds:uri="http://schemas.microsoft.com/internal/obd"/>
   </ds:schemaRefs>
 </ds:datastoreItem>
-</file>
-
-<file path=customXml/itemProps3.xml><?xml version="1.0" encoding="utf-8"?>
-<ds:datastoreItem xmlns:ds="http://schemas.openxmlformats.org/officeDocument/2006/customXml" ds:itemID="{60C67BEE-D13F-4BD2-98A5-34D8A0977F68}">
-  <ds:schemaRefs>
-    <ds:schemaRef ds:uri="4873beb7-5857-4685-be1f-d57550cc96cc"/>
-    <ds:schemaRef ds:uri="http://schemas.openxmlformats.org/package/2006/metadata/core-properties"/>
-    <ds:schemaRef ds:uri="http://purl.org/dc/terms/"/>
-    <ds:schemaRef ds:uri="http://schemas.microsoft.com/office/2006/documentManagement/types"/>
-    <ds:schemaRef ds:uri="http://purl.org/dc/elements/1.1/"/>
-    <ds:schemaRef ds:uri="http://schemas.microsoft.com/office/2006/metadata/properties"/>
-    <ds:schemaRef ds:uri="http://schemas.microsoft.com/office/infopath/2007/PartnerControls"/>
-    <ds:schemaRef ds:uri="http://www.w3.org/XML/1998/namespace"/>
-    <ds:schemaRef ds:uri="http://purl.org/dc/dcmitype/"/>
-  </ds:schemaRefs>
-</ds:datastoreItem>
 </file>
</xml_diff>